<commit_message>
node js mongo db
node js mongo db
</commit_message>
<xml_diff>
--- a/PowerPointSlides/13 Node js MongoDB.pptx
+++ b/PowerPointSlides/13 Node js MongoDB.pptx
@@ -15,6 +15,7 @@
     <p:sldId id="266" r:id="rId9"/>
     <p:sldId id="267" r:id="rId10"/>
     <p:sldId id="268" r:id="rId11"/>
+    <p:sldId id="269" r:id="rId12"/>
   </p:sldIdLst>
   <p:sldSz cx="9144000" cy="5143500" type="screen16x9"/>
   <p:notesSz cx="6858000" cy="9144000"/>
@@ -298,7 +299,7 @@
             <a:fld id="{1D8BD707-D9CF-40AE-B4C6-C98DA3205C09}" type="datetimeFigureOut">
               <a:rPr lang="en-US" smtClean="0"/>
               <a:pPr/>
-              <a:t>10/3/2020</a:t>
+              <a:t>10/4/2020</a:t>
             </a:fld>
             <a:endParaRPr lang="en-US"/>
           </a:p>
@@ -465,7 +466,7 @@
             <a:fld id="{1D8BD707-D9CF-40AE-B4C6-C98DA3205C09}" type="datetimeFigureOut">
               <a:rPr lang="en-US" smtClean="0"/>
               <a:pPr/>
-              <a:t>10/3/2020</a:t>
+              <a:t>10/4/2020</a:t>
             </a:fld>
             <a:endParaRPr lang="en-US"/>
           </a:p>
@@ -642,7 +643,7 @@
             <a:fld id="{1D8BD707-D9CF-40AE-B4C6-C98DA3205C09}" type="datetimeFigureOut">
               <a:rPr lang="en-US" smtClean="0"/>
               <a:pPr/>
-              <a:t>10/3/2020</a:t>
+              <a:t>10/4/2020</a:t>
             </a:fld>
             <a:endParaRPr lang="en-US"/>
           </a:p>
@@ -809,7 +810,7 @@
             <a:fld id="{1D8BD707-D9CF-40AE-B4C6-C98DA3205C09}" type="datetimeFigureOut">
               <a:rPr lang="en-US" smtClean="0"/>
               <a:pPr/>
-              <a:t>10/3/2020</a:t>
+              <a:t>10/4/2020</a:t>
             </a:fld>
             <a:endParaRPr lang="en-US"/>
           </a:p>
@@ -1052,7 +1053,7 @@
             <a:fld id="{1D8BD707-D9CF-40AE-B4C6-C98DA3205C09}" type="datetimeFigureOut">
               <a:rPr lang="en-US" smtClean="0"/>
               <a:pPr/>
-              <a:t>10/3/2020</a:t>
+              <a:t>10/4/2020</a:t>
             </a:fld>
             <a:endParaRPr lang="en-US"/>
           </a:p>
@@ -1337,7 +1338,7 @@
             <a:fld id="{1D8BD707-D9CF-40AE-B4C6-C98DA3205C09}" type="datetimeFigureOut">
               <a:rPr lang="en-US" smtClean="0"/>
               <a:pPr/>
-              <a:t>10/3/2020</a:t>
+              <a:t>10/4/2020</a:t>
             </a:fld>
             <a:endParaRPr lang="en-US"/>
           </a:p>
@@ -1756,7 +1757,7 @@
             <a:fld id="{1D8BD707-D9CF-40AE-B4C6-C98DA3205C09}" type="datetimeFigureOut">
               <a:rPr lang="en-US" smtClean="0"/>
               <a:pPr/>
-              <a:t>10/3/2020</a:t>
+              <a:t>10/4/2020</a:t>
             </a:fld>
             <a:endParaRPr lang="en-US"/>
           </a:p>
@@ -1871,7 +1872,7 @@
             <a:fld id="{1D8BD707-D9CF-40AE-B4C6-C98DA3205C09}" type="datetimeFigureOut">
               <a:rPr lang="en-US" smtClean="0"/>
               <a:pPr/>
-              <a:t>10/3/2020</a:t>
+              <a:t>10/4/2020</a:t>
             </a:fld>
             <a:endParaRPr lang="en-US"/>
           </a:p>
@@ -1963,7 +1964,7 @@
             <a:fld id="{1D8BD707-D9CF-40AE-B4C6-C98DA3205C09}" type="datetimeFigureOut">
               <a:rPr lang="en-US" smtClean="0"/>
               <a:pPr/>
-              <a:t>10/3/2020</a:t>
+              <a:t>10/4/2020</a:t>
             </a:fld>
             <a:endParaRPr lang="en-US"/>
           </a:p>
@@ -2237,7 +2238,7 @@
             <a:fld id="{1D8BD707-D9CF-40AE-B4C6-C98DA3205C09}" type="datetimeFigureOut">
               <a:rPr lang="en-US" smtClean="0"/>
               <a:pPr/>
-              <a:t>10/3/2020</a:t>
+              <a:t>10/4/2020</a:t>
             </a:fld>
             <a:endParaRPr lang="en-US"/>
           </a:p>
@@ -2487,7 +2488,7 @@
             <a:fld id="{1D8BD707-D9CF-40AE-B4C6-C98DA3205C09}" type="datetimeFigureOut">
               <a:rPr lang="en-US" smtClean="0"/>
               <a:pPr/>
-              <a:t>10/3/2020</a:t>
+              <a:t>10/4/2020</a:t>
             </a:fld>
             <a:endParaRPr lang="en-US"/>
           </a:p>
@@ -2706,7 +2707,7 @@
             <a:fld id="{1D8BD707-D9CF-40AE-B4C6-C98DA3205C09}" type="datetimeFigureOut">
               <a:rPr lang="en-US" smtClean="0"/>
               <a:pPr/>
-              <a:t>10/3/2020</a:t>
+              <a:t>10/4/2020</a:t>
             </a:fld>
             <a:endParaRPr lang="en-US"/>
           </a:p>
@@ -3305,10 +3306,241 @@
           </a:p>
         </p:txBody>
       </p:sp>
+      <p:pic>
+        <p:nvPicPr>
+          <p:cNvPr id="1026" name="Picture 2"/>
+          <p:cNvPicPr>
+            <a:picLocks noChangeAspect="1" noChangeArrowheads="1"/>
+          </p:cNvPicPr>
+          <p:nvPr/>
+        </p:nvPicPr>
+        <p:blipFill>
+          <a:blip r:embed="rId3">
+            <a:extLst>
+              <a:ext uri="{28A0092B-C50C-407E-A947-70E740481C1C}">
+                <a14:useLocalDpi xmlns:a14="http://schemas.microsoft.com/office/drawing/2010/main" val="0"/>
+              </a:ext>
+            </a:extLst>
+          </a:blip>
+          <a:srcRect/>
+          <a:stretch>
+            <a:fillRect/>
+          </a:stretch>
+        </p:blipFill>
+        <p:spPr bwMode="auto">
+          <a:xfrm>
+            <a:off x="457200" y="1352550"/>
+            <a:ext cx="6455312" cy="3609975"/>
+          </a:xfrm>
+          <a:prstGeom prst="rect">
+            <a:avLst/>
+          </a:prstGeom>
+          <a:noFill/>
+          <a:ln>
+            <a:noFill/>
+          </a:ln>
+          <a:effectLst/>
+          <a:extLst>
+            <a:ext uri="{909E8E84-426E-40DD-AFC4-6F175D3DCCD1}">
+              <a14:hiddenFill xmlns:a14="http://schemas.microsoft.com/office/drawing/2010/main">
+                <a:solidFill>
+                  <a:schemeClr val="accent1"/>
+                </a:solidFill>
+              </a14:hiddenFill>
+            </a:ext>
+            <a:ext uri="{91240B29-F687-4F45-9708-019B960494DF}">
+              <a14:hiddenLine xmlns:a14="http://schemas.microsoft.com/office/drawing/2010/main" w="9525">
+                <a:solidFill>
+                  <a:schemeClr val="tx1"/>
+                </a:solidFill>
+                <a:miter lim="800000"/>
+                <a:headEnd/>
+                <a:tailEnd/>
+              </a14:hiddenLine>
+            </a:ext>
+            <a:ext uri="{AF507438-7753-43E0-B8FC-AC1667EBCBE1}">
+              <a14:hiddenEffects xmlns:a14="http://schemas.microsoft.com/office/drawing/2010/main">
+                <a:effectLst>
+                  <a:outerShdw dist="35921" dir="2700000" algn="ctr" rotWithShape="0">
+                    <a:schemeClr val="bg2"/>
+                  </a:outerShdw>
+                </a:effectLst>
+              </a14:hiddenEffects>
+            </a:ext>
+          </a:extLst>
+        </p:spPr>
+      </p:pic>
     </p:spTree>
     <p:extLst>
       <p:ext uri="{BB962C8B-B14F-4D97-AF65-F5344CB8AC3E}">
         <p14:creationId xmlns:p14="http://schemas.microsoft.com/office/powerpoint/2010/main" val="464100604"/>
+      </p:ext>
+    </p:extLst>
+  </p:cSld>
+  <p:clrMapOvr>
+    <a:masterClrMapping/>
+  </p:clrMapOvr>
+  <p:timing>
+    <p:tnLst>
+      <p:par>
+        <p:cTn id="1" dur="indefinite" restart="never" nodeType="tmRoot"/>
+      </p:par>
+    </p:tnLst>
+  </p:timing>
+</p:sld>
+</file>
+
+<file path=ppt/slides/slide11.xml><?xml version="1.0" encoding="utf-8"?>
+<p:sld xmlns:a="http://schemas.openxmlformats.org/drawingml/2006/main" xmlns:r="http://schemas.openxmlformats.org/officeDocument/2006/relationships" xmlns:p="http://schemas.openxmlformats.org/presentationml/2006/main">
+  <p:cSld>
+    <p:bg>
+      <p:bgPr>
+        <a:blipFill dpi="0" rotWithShape="1">
+          <a:blip r:embed="rId2">
+            <a:lum/>
+          </a:blip>
+          <a:srcRect/>
+          <a:stretch>
+            <a:fillRect/>
+          </a:stretch>
+        </a:blipFill>
+        <a:effectLst/>
+      </p:bgPr>
+    </p:bg>
+    <p:spTree>
+      <p:nvGrpSpPr>
+        <p:cNvPr id="1" name=""/>
+        <p:cNvGrpSpPr/>
+        <p:nvPr/>
+      </p:nvGrpSpPr>
+      <p:grpSpPr>
+        <a:xfrm>
+          <a:off x="0" y="0"/>
+          <a:ext cx="0" cy="0"/>
+          <a:chOff x="0" y="0"/>
+          <a:chExt cx="0" cy="0"/>
+        </a:xfrm>
+      </p:grpSpPr>
+      <p:sp>
+        <p:nvSpPr>
+          <p:cNvPr id="4" name="TextBox 3"/>
+          <p:cNvSpPr txBox="1"/>
+          <p:nvPr/>
+        </p:nvSpPr>
+        <p:spPr>
+          <a:xfrm>
+            <a:off x="685800" y="128885"/>
+            <a:ext cx="2475358" cy="461665"/>
+          </a:xfrm>
+          <a:prstGeom prst="rect">
+            <a:avLst/>
+          </a:prstGeom>
+          <a:noFill/>
+        </p:spPr>
+        <p:txBody>
+          <a:bodyPr wrap="none" rtlCol="0">
+            <a:spAutoFit/>
+          </a:bodyPr>
+          <a:lstStyle/>
+          <a:p>
+            <a:r>
+              <a:rPr lang="en-US" sz="2400" dirty="0" smtClean="0">
+                <a:solidFill>
+                  <a:schemeClr val="bg1"/>
+                </a:solidFill>
+                <a:latin typeface="Bahnschrift Condensed" pitchFamily="34" charset="0"/>
+              </a:rPr>
+              <a:t>Node JS With MongoDB</a:t>
+            </a:r>
+            <a:endParaRPr lang="en-US" sz="2400" dirty="0">
+              <a:solidFill>
+                <a:schemeClr val="bg1"/>
+              </a:solidFill>
+              <a:latin typeface="Bahnschrift Condensed" pitchFamily="34" charset="0"/>
+            </a:endParaRPr>
+          </a:p>
+        </p:txBody>
+      </p:sp>
+      <p:sp>
+        <p:nvSpPr>
+          <p:cNvPr id="6" name="TextBox 5"/>
+          <p:cNvSpPr txBox="1"/>
+          <p:nvPr/>
+        </p:nvSpPr>
+        <p:spPr>
+          <a:xfrm>
+            <a:off x="304800" y="895350"/>
+            <a:ext cx="3327514" cy="1384995"/>
+          </a:xfrm>
+          <a:prstGeom prst="rect">
+            <a:avLst/>
+          </a:prstGeom>
+          <a:noFill/>
+        </p:spPr>
+        <p:txBody>
+          <a:bodyPr wrap="none" rtlCol="0">
+            <a:spAutoFit/>
+          </a:bodyPr>
+          <a:lstStyle/>
+          <a:p>
+            <a:r>
+              <a:rPr lang="en-US" sz="2400" dirty="0" smtClean="0">
+                <a:latin typeface="Bahnschrift Condensed" pitchFamily="34" charset="0"/>
+              </a:rPr>
+              <a:t>Select Data : </a:t>
+            </a:r>
+            <a:endParaRPr lang="en-US" dirty="0" smtClean="0">
+              <a:latin typeface="Bahnschrift Condensed" pitchFamily="34" charset="0"/>
+            </a:endParaRPr>
+          </a:p>
+          <a:p>
+            <a:pPr marL="285750" indent="-285750">
+              <a:buFont typeface="Arial" pitchFamily="34" charset="0"/>
+              <a:buChar char="•"/>
+            </a:pPr>
+            <a:r>
+              <a:rPr lang="en-US" b="1" dirty="0" err="1"/>
+              <a:t>findOne</a:t>
+            </a:r>
+            <a:r>
+              <a:rPr lang="en-US" b="1" dirty="0" smtClean="0"/>
+              <a:t>() </a:t>
+            </a:r>
+            <a:r>
+              <a:rPr lang="en-US" dirty="0" smtClean="0"/>
+              <a:t>to select one object </a:t>
+            </a:r>
+          </a:p>
+          <a:p>
+            <a:pPr marL="285750" indent="-285750">
+              <a:buFont typeface="Arial" pitchFamily="34" charset="0"/>
+              <a:buChar char="•"/>
+            </a:pPr>
+            <a:r>
+              <a:rPr lang="en-US" b="1" dirty="0" smtClean="0"/>
+              <a:t>find</a:t>
+            </a:r>
+            <a:r>
+              <a:rPr lang="en-US" b="1" dirty="0"/>
+              <a:t>() </a:t>
+            </a:r>
+            <a:r>
+              <a:rPr lang="en-US" dirty="0" smtClean="0"/>
+              <a:t>to select all</a:t>
+            </a:r>
+            <a:endParaRPr lang="en-US" dirty="0" smtClean="0"/>
+          </a:p>
+          <a:p>
+            <a:endParaRPr lang="en-US" sz="2400" dirty="0" smtClean="0">
+              <a:latin typeface="Bahnschrift Condensed" pitchFamily="34" charset="0"/>
+            </a:endParaRPr>
+          </a:p>
+        </p:txBody>
+      </p:sp>
+    </p:spTree>
+    <p:extLst>
+      <p:ext uri="{BB962C8B-B14F-4D97-AF65-F5344CB8AC3E}">
+        <p14:creationId xmlns:p14="http://schemas.microsoft.com/office/powerpoint/2010/main" val="2594880422"/>
       </p:ext>
     </p:extLst>
   </p:cSld>
@@ -3973,9 +4205,6 @@
               </a:rPr>
               <a:t> Cluster  </a:t>
             </a:r>
-            <a:endParaRPr lang="en-US" sz="2400" dirty="0" smtClean="0">
-              <a:latin typeface="Bahnschrift Condensed" pitchFamily="34" charset="0"/>
-            </a:endParaRPr>
           </a:p>
         </p:txBody>
       </p:sp>
@@ -4174,9 +4403,6 @@
               </a:rPr>
               <a:t> Cluster  </a:t>
             </a:r>
-            <a:endParaRPr lang="en-US" sz="2400" dirty="0" smtClean="0">
-              <a:latin typeface="Bahnschrift Condensed" pitchFamily="34" charset="0"/>
-            </a:endParaRPr>
           </a:p>
         </p:txBody>
       </p:sp>
@@ -4216,15 +4442,7 @@
             </a:r>
             <a:r>
               <a:rPr lang="en-US" sz="1200" dirty="0"/>
-              <a:t> </a:t>
-            </a:r>
-            <a:r>
-              <a:rPr lang="en-US" sz="1200" dirty="0"/>
-              <a:t>= require(</a:t>
-            </a:r>
-            <a:r>
-              <a:rPr lang="en-US" sz="1200" dirty="0"/>
-              <a:t>'</a:t>
+              <a:t> = require('</a:t>
             </a:r>
             <a:r>
               <a:rPr lang="en-US" sz="1200" dirty="0" err="1"/>
@@ -4232,11 +4450,7 @@
             </a:r>
             <a:r>
               <a:rPr lang="en-US" sz="1200" dirty="0"/>
-              <a:t>'</a:t>
-            </a:r>
-            <a:r>
-              <a:rPr lang="en-US" sz="1200" dirty="0"/>
-              <a:t>).</a:t>
+              <a:t>').</a:t>
             </a:r>
             <a:r>
               <a:rPr lang="en-US" sz="1200" dirty="0" err="1"/>
@@ -4263,15 +4477,7 @@
             </a:r>
             <a:r>
               <a:rPr lang="en-US" sz="1200" dirty="0"/>
-              <a:t> </a:t>
-            </a:r>
-            <a:r>
-              <a:rPr lang="en-US" sz="1200" dirty="0"/>
-              <a:t>= </a:t>
-            </a:r>
-            <a:r>
-              <a:rPr lang="en-US" sz="1200" dirty="0"/>
-              <a:t>"</a:t>
+              <a:t> = "</a:t>
             </a:r>
             <a:r>
               <a:rPr lang="en-US" sz="1200" dirty="0" err="1"/>
@@ -4287,11 +4493,7 @@
             </a:r>
             <a:r>
               <a:rPr lang="en-US" sz="1200" dirty="0"/>
-              <a:t>=majority"</a:t>
-            </a:r>
-            <a:r>
-              <a:rPr lang="en-US" sz="1200" dirty="0"/>
-              <a:t>;</a:t>
+              <a:t>=majority";</a:t>
             </a:r>
             <a:br>
               <a:rPr lang="en-US" sz="1200" dirty="0"/>
@@ -4318,15 +4520,7 @@
             </a:r>
             <a:r>
               <a:rPr lang="en-US" sz="1200" dirty="0"/>
-              <a:t>: </a:t>
-            </a:r>
-            <a:r>
-              <a:rPr lang="en-US" sz="1200" dirty="0"/>
-              <a:t>true</a:t>
-            </a:r>
-            <a:r>
-              <a:rPr lang="en-US" sz="1200" dirty="0"/>
-              <a:t>, </a:t>
+              <a:t>: true, </a:t>
             </a:r>
             <a:r>
               <a:rPr lang="en-US" sz="1200" dirty="0" err="1"/>
@@ -4334,30 +4528,14 @@
             </a:r>
             <a:r>
               <a:rPr lang="en-US" sz="1200" dirty="0"/>
-              <a:t>: </a:t>
-            </a:r>
-            <a:r>
-              <a:rPr lang="en-US" sz="1200" dirty="0"/>
-              <a:t>true </a:t>
-            </a:r>
-            <a:r>
-              <a:rPr lang="en-US" sz="1200" dirty="0"/>
-              <a:t>}</a:t>
+              <a:t>: true }</a:t>
             </a:r>
             <a:br>
               <a:rPr lang="en-US" sz="1200" dirty="0"/>
             </a:br>
             <a:r>
               <a:rPr lang="en-US" sz="1200" dirty="0" err="1"/>
-              <a:t>MongoClient</a:t>
-            </a:r>
-            <a:r>
-              <a:rPr lang="en-US" sz="1200" dirty="0" err="1"/>
-              <a:t>.</a:t>
-            </a:r>
-            <a:r>
-              <a:rPr lang="en-US" sz="1200" dirty="0" err="1"/>
-              <a:t>connect</a:t>
+              <a:t>MongoClient.connect</a:t>
             </a:r>
             <a:r>
               <a:rPr lang="en-US" sz="1200" dirty="0"/>
@@ -4365,73 +4543,25 @@
             </a:r>
             <a:r>
               <a:rPr lang="en-US" sz="1200" dirty="0" err="1"/>
-              <a:t>url</a:t>
-            </a:r>
-            <a:r>
-              <a:rPr lang="en-US" sz="1200" dirty="0" err="1"/>
-              <a:t>,</a:t>
-            </a:r>
-            <a:r>
-              <a:rPr lang="en-US" sz="1200" dirty="0" err="1"/>
-              <a:t>config</a:t>
+              <a:t>url,config</a:t>
             </a:r>
             <a:r>
               <a:rPr lang="en-US" sz="1200" dirty="0"/>
-              <a:t>, </a:t>
-            </a:r>
-            <a:r>
-              <a:rPr lang="en-US" sz="1200" dirty="0"/>
-              <a:t>function</a:t>
-            </a:r>
-            <a:r>
-              <a:rPr lang="en-US" sz="1200" dirty="0"/>
-              <a:t>(err) {</a:t>
+              <a:t>, function(err) {</a:t>
             </a:r>
             <a:br>
               <a:rPr lang="en-US" sz="1200" dirty="0"/>
             </a:br>
             <a:r>
               <a:rPr lang="en-US" sz="1200" dirty="0"/>
-              <a:t> </a:t>
-            </a:r>
-            <a:r>
-              <a:rPr lang="en-US" sz="1200" dirty="0"/>
-              <a:t>if</a:t>
-            </a:r>
-            <a:r>
-              <a:rPr lang="en-US" sz="1200" dirty="0"/>
-              <a:t>(err){</a:t>
+              <a:t> if(err){</a:t>
             </a:r>
             <a:br>
               <a:rPr lang="en-US" sz="1200" dirty="0"/>
             </a:br>
             <a:r>
               <a:rPr lang="en-US" sz="1200" dirty="0"/>
-              <a:t>     </a:t>
-            </a:r>
-            <a:r>
-              <a:rPr lang="en-US" sz="1200" dirty="0"/>
-              <a:t>console</a:t>
-            </a:r>
-            <a:r>
-              <a:rPr lang="en-US" sz="1200" dirty="0"/>
-              <a:t>.</a:t>
-            </a:r>
-            <a:r>
-              <a:rPr lang="en-US" sz="1200" dirty="0"/>
-              <a:t>log</a:t>
-            </a:r>
-            <a:r>
-              <a:rPr lang="en-US" sz="1200" dirty="0"/>
-              <a:t>(</a:t>
-            </a:r>
-            <a:r>
-              <a:rPr lang="en-US" sz="1200" dirty="0"/>
-              <a:t>"Fail"</a:t>
-            </a:r>
-            <a:r>
-              <a:rPr lang="en-US" sz="1200" dirty="0"/>
-              <a:t>)</a:t>
+              <a:t>     console.log("Fail")</a:t>
             </a:r>
             <a:br>
               <a:rPr lang="en-US" sz="1200" dirty="0"/>
@@ -4445,46 +4575,14 @@
             </a:br>
             <a:r>
               <a:rPr lang="en-US" sz="1200" dirty="0"/>
-              <a:t> </a:t>
-            </a:r>
-            <a:r>
-              <a:rPr lang="en-US" sz="1200" dirty="0"/>
-              <a:t>else</a:t>
-            </a:r>
-            <a:r>
-              <a:rPr lang="en-US" sz="1200" dirty="0"/>
-              <a:t>{</a:t>
+              <a:t> else{</a:t>
             </a:r>
             <a:br>
               <a:rPr lang="en-US" sz="1200" dirty="0"/>
             </a:br>
             <a:r>
               <a:rPr lang="en-US" sz="1200" dirty="0"/>
-              <a:t>     </a:t>
-            </a:r>
-            <a:r>
-              <a:rPr lang="en-US" sz="1200" dirty="0"/>
-              <a:t>console</a:t>
-            </a:r>
-            <a:r>
-              <a:rPr lang="en-US" sz="1200" dirty="0"/>
-              <a:t>.</a:t>
-            </a:r>
-            <a:r>
-              <a:rPr lang="en-US" sz="1200" dirty="0"/>
-              <a:t>log</a:t>
-            </a:r>
-            <a:r>
-              <a:rPr lang="en-US" sz="1200" dirty="0"/>
-              <a:t>(</a:t>
-            </a:r>
-            <a:r>
-              <a:rPr lang="en-US" sz="1200" dirty="0"/>
-              <a:t>"Success"</a:t>
-            </a:r>
-            <a:r>
-              <a:rPr lang="en-US" sz="1200" dirty="0"/>
-              <a:t>)</a:t>
+              <a:t>     console.log("Success")</a:t>
             </a:r>
             <a:br>
               <a:rPr lang="en-US" sz="1200" dirty="0"/>
@@ -4647,9 +4745,6 @@
               </a:rPr>
               <a:t> </a:t>
             </a:r>
-            <a:endParaRPr lang="en-US" sz="2400" dirty="0" smtClean="0">
-              <a:latin typeface="Bahnschrift Condensed" pitchFamily="34" charset="0"/>
-            </a:endParaRPr>
           </a:p>
         </p:txBody>
       </p:sp>
@@ -4848,14 +4943,7 @@
                 <a:latin typeface="Bahnschrift Condensed" pitchFamily="34" charset="0"/>
                 <a:sym typeface="Wingdings" pitchFamily="2" charset="2"/>
               </a:rPr>
-              <a:t>Database</a:t>
-            </a:r>
-            <a:r>
-              <a:rPr lang="en-US" sz="2400" dirty="0" err="1" smtClean="0">
-                <a:latin typeface="Bahnschrift Condensed" pitchFamily="34" charset="0"/>
-                <a:sym typeface="Wingdings" pitchFamily="2" charset="2"/>
-              </a:rPr>
-              <a:t>Specific</a:t>
+              <a:t>DatabaseSpecific</a:t>
             </a:r>
             <a:r>
               <a:rPr lang="en-US" sz="2400" dirty="0" smtClean="0">

</xml_diff>

<commit_message>
Node js with mongo
Node js with mongo
</commit_message>
<xml_diff>
--- a/PowerPointSlides/13 Node js MongoDB.pptx
+++ b/PowerPointSlides/13 Node js MongoDB.pptx
@@ -16,6 +16,12 @@
     <p:sldId id="267" r:id="rId10"/>
     <p:sldId id="268" r:id="rId11"/>
     <p:sldId id="269" r:id="rId12"/>
+    <p:sldId id="270" r:id="rId13"/>
+    <p:sldId id="271" r:id="rId14"/>
+    <p:sldId id="272" r:id="rId15"/>
+    <p:sldId id="273" r:id="rId16"/>
+    <p:sldId id="274" r:id="rId17"/>
+    <p:sldId id="275" r:id="rId18"/>
   </p:sldIdLst>
   <p:sldSz cx="9144000" cy="5143500" type="screen16x9"/>
   <p:notesSz cx="6858000" cy="9144000"/>
@@ -299,7 +305,7 @@
             <a:fld id="{1D8BD707-D9CF-40AE-B4C6-C98DA3205C09}" type="datetimeFigureOut">
               <a:rPr lang="en-US" smtClean="0"/>
               <a:pPr/>
-              <a:t>10/4/2020</a:t>
+              <a:t>10/13/2020</a:t>
             </a:fld>
             <a:endParaRPr lang="en-US"/>
           </a:p>
@@ -466,7 +472,7 @@
             <a:fld id="{1D8BD707-D9CF-40AE-B4C6-C98DA3205C09}" type="datetimeFigureOut">
               <a:rPr lang="en-US" smtClean="0"/>
               <a:pPr/>
-              <a:t>10/4/2020</a:t>
+              <a:t>10/13/2020</a:t>
             </a:fld>
             <a:endParaRPr lang="en-US"/>
           </a:p>
@@ -643,7 +649,7 @@
             <a:fld id="{1D8BD707-D9CF-40AE-B4C6-C98DA3205C09}" type="datetimeFigureOut">
               <a:rPr lang="en-US" smtClean="0"/>
               <a:pPr/>
-              <a:t>10/4/2020</a:t>
+              <a:t>10/13/2020</a:t>
             </a:fld>
             <a:endParaRPr lang="en-US"/>
           </a:p>
@@ -810,7 +816,7 @@
             <a:fld id="{1D8BD707-D9CF-40AE-B4C6-C98DA3205C09}" type="datetimeFigureOut">
               <a:rPr lang="en-US" smtClean="0"/>
               <a:pPr/>
-              <a:t>10/4/2020</a:t>
+              <a:t>10/13/2020</a:t>
             </a:fld>
             <a:endParaRPr lang="en-US"/>
           </a:p>
@@ -1053,7 +1059,7 @@
             <a:fld id="{1D8BD707-D9CF-40AE-B4C6-C98DA3205C09}" type="datetimeFigureOut">
               <a:rPr lang="en-US" smtClean="0"/>
               <a:pPr/>
-              <a:t>10/4/2020</a:t>
+              <a:t>10/13/2020</a:t>
             </a:fld>
             <a:endParaRPr lang="en-US"/>
           </a:p>
@@ -1338,7 +1344,7 @@
             <a:fld id="{1D8BD707-D9CF-40AE-B4C6-C98DA3205C09}" type="datetimeFigureOut">
               <a:rPr lang="en-US" smtClean="0"/>
               <a:pPr/>
-              <a:t>10/4/2020</a:t>
+              <a:t>10/13/2020</a:t>
             </a:fld>
             <a:endParaRPr lang="en-US"/>
           </a:p>
@@ -1757,7 +1763,7 @@
             <a:fld id="{1D8BD707-D9CF-40AE-B4C6-C98DA3205C09}" type="datetimeFigureOut">
               <a:rPr lang="en-US" smtClean="0"/>
               <a:pPr/>
-              <a:t>10/4/2020</a:t>
+              <a:t>10/13/2020</a:t>
             </a:fld>
             <a:endParaRPr lang="en-US"/>
           </a:p>
@@ -1872,7 +1878,7 @@
             <a:fld id="{1D8BD707-D9CF-40AE-B4C6-C98DA3205C09}" type="datetimeFigureOut">
               <a:rPr lang="en-US" smtClean="0"/>
               <a:pPr/>
-              <a:t>10/4/2020</a:t>
+              <a:t>10/13/2020</a:t>
             </a:fld>
             <a:endParaRPr lang="en-US"/>
           </a:p>
@@ -1964,7 +1970,7 @@
             <a:fld id="{1D8BD707-D9CF-40AE-B4C6-C98DA3205C09}" type="datetimeFigureOut">
               <a:rPr lang="en-US" smtClean="0"/>
               <a:pPr/>
-              <a:t>10/4/2020</a:t>
+              <a:t>10/13/2020</a:t>
             </a:fld>
             <a:endParaRPr lang="en-US"/>
           </a:p>
@@ -2238,7 +2244,7 @@
             <a:fld id="{1D8BD707-D9CF-40AE-B4C6-C98DA3205C09}" type="datetimeFigureOut">
               <a:rPr lang="en-US" smtClean="0"/>
               <a:pPr/>
-              <a:t>10/4/2020</a:t>
+              <a:t>10/13/2020</a:t>
             </a:fld>
             <a:endParaRPr lang="en-US"/>
           </a:p>
@@ -2488,7 +2494,7 @@
             <a:fld id="{1D8BD707-D9CF-40AE-B4C6-C98DA3205C09}" type="datetimeFigureOut">
               <a:rPr lang="en-US" smtClean="0"/>
               <a:pPr/>
-              <a:t>10/4/2020</a:t>
+              <a:t>10/13/2020</a:t>
             </a:fld>
             <a:endParaRPr lang="en-US"/>
           </a:p>
@@ -2707,7 +2713,7 @@
             <a:fld id="{1D8BD707-D9CF-40AE-B4C6-C98DA3205C09}" type="datetimeFigureOut">
               <a:rPr lang="en-US" smtClean="0"/>
               <a:pPr/>
-              <a:t>10/4/2020</a:t>
+              <a:t>10/13/2020</a:t>
             </a:fld>
             <a:endParaRPr lang="en-US"/>
           </a:p>
@@ -3470,7 +3476,7 @@
         <p:spPr>
           <a:xfrm>
             <a:off x="304800" y="895350"/>
-            <a:ext cx="3327514" cy="1384995"/>
+            <a:ext cx="3345147" cy="738664"/>
           </a:xfrm>
           <a:prstGeom prst="rect">
             <a:avLst/>
@@ -3487,7 +3493,13 @@
               <a:rPr lang="en-US" sz="2400" dirty="0" smtClean="0">
                 <a:latin typeface="Bahnschrift Condensed" pitchFamily="34" charset="0"/>
               </a:rPr>
-              <a:t>Select Data : </a:t>
+              <a:t>Find </a:t>
+            </a:r>
+            <a:r>
+              <a:rPr lang="en-US" sz="2400" dirty="0" smtClean="0">
+                <a:latin typeface="Bahnschrift Condensed" pitchFamily="34" charset="0"/>
+              </a:rPr>
+              <a:t>Data : </a:t>
             </a:r>
             <a:endParaRPr lang="en-US" dirty="0" smtClean="0">
               <a:latin typeface="Bahnschrift Condensed" pitchFamily="34" charset="0"/>
@@ -3511,36 +3523,1278 @@
               <a:t>to select one object </a:t>
             </a:r>
           </a:p>
+        </p:txBody>
+      </p:sp>
+      <p:pic>
+        <p:nvPicPr>
+          <p:cNvPr id="1026" name="Picture 2"/>
+          <p:cNvPicPr>
+            <a:picLocks noChangeAspect="1" noChangeArrowheads="1"/>
+          </p:cNvPicPr>
+          <p:nvPr/>
+        </p:nvPicPr>
+        <p:blipFill>
+          <a:blip r:embed="rId3">
+            <a:extLst>
+              <a:ext uri="{28A0092B-C50C-407E-A947-70E740481C1C}">
+                <a14:useLocalDpi xmlns:a14="http://schemas.microsoft.com/office/drawing/2010/main" val="0"/>
+              </a:ext>
+            </a:extLst>
+          </a:blip>
+          <a:srcRect/>
+          <a:stretch>
+            <a:fillRect/>
+          </a:stretch>
+        </p:blipFill>
+        <p:spPr bwMode="auto">
+          <a:xfrm>
+            <a:off x="465583" y="1581150"/>
+            <a:ext cx="5391150" cy="3278402"/>
+          </a:xfrm>
+          <a:prstGeom prst="rect">
+            <a:avLst/>
+          </a:prstGeom>
+          <a:noFill/>
+          <a:ln>
+            <a:noFill/>
+          </a:ln>
+          <a:effectLst/>
+          <a:extLst>
+            <a:ext uri="{909E8E84-426E-40DD-AFC4-6F175D3DCCD1}">
+              <a14:hiddenFill xmlns:a14="http://schemas.microsoft.com/office/drawing/2010/main">
+                <a:solidFill>
+                  <a:schemeClr val="accent1"/>
+                </a:solidFill>
+              </a14:hiddenFill>
+            </a:ext>
+            <a:ext uri="{91240B29-F687-4F45-9708-019B960494DF}">
+              <a14:hiddenLine xmlns:a14="http://schemas.microsoft.com/office/drawing/2010/main" w="9525">
+                <a:solidFill>
+                  <a:schemeClr val="tx1"/>
+                </a:solidFill>
+                <a:miter lim="800000"/>
+                <a:headEnd/>
+                <a:tailEnd/>
+              </a14:hiddenLine>
+            </a:ext>
+            <a:ext uri="{AF507438-7753-43E0-B8FC-AC1667EBCBE1}">
+              <a14:hiddenEffects xmlns:a14="http://schemas.microsoft.com/office/drawing/2010/main">
+                <a:effectLst>
+                  <a:outerShdw dist="35921" dir="2700000" algn="ctr" rotWithShape="0">
+                    <a:schemeClr val="bg2"/>
+                  </a:outerShdw>
+                </a:effectLst>
+              </a14:hiddenEffects>
+            </a:ext>
+          </a:extLst>
+        </p:spPr>
+      </p:pic>
+    </p:spTree>
+    <p:extLst>
+      <p:ext uri="{BB962C8B-B14F-4D97-AF65-F5344CB8AC3E}">
+        <p14:creationId xmlns:p14="http://schemas.microsoft.com/office/powerpoint/2010/main" val="2594880422"/>
+      </p:ext>
+    </p:extLst>
+  </p:cSld>
+  <p:clrMapOvr>
+    <a:masterClrMapping/>
+  </p:clrMapOvr>
+  <p:timing>
+    <p:tnLst>
+      <p:par>
+        <p:cTn id="1" dur="indefinite" restart="never" nodeType="tmRoot"/>
+      </p:par>
+    </p:tnLst>
+  </p:timing>
+</p:sld>
+</file>
+
+<file path=ppt/slides/slide12.xml><?xml version="1.0" encoding="utf-8"?>
+<p:sld xmlns:a="http://schemas.openxmlformats.org/drawingml/2006/main" xmlns:r="http://schemas.openxmlformats.org/officeDocument/2006/relationships" xmlns:p="http://schemas.openxmlformats.org/presentationml/2006/main">
+  <p:cSld>
+    <p:bg>
+      <p:bgPr>
+        <a:blipFill dpi="0" rotWithShape="1">
+          <a:blip r:embed="rId2">
+            <a:lum/>
+          </a:blip>
+          <a:srcRect/>
+          <a:stretch>
+            <a:fillRect/>
+          </a:stretch>
+        </a:blipFill>
+        <a:effectLst/>
+      </p:bgPr>
+    </p:bg>
+    <p:spTree>
+      <p:nvGrpSpPr>
+        <p:cNvPr id="1" name=""/>
+        <p:cNvGrpSpPr/>
+        <p:nvPr/>
+      </p:nvGrpSpPr>
+      <p:grpSpPr>
+        <a:xfrm>
+          <a:off x="0" y="0"/>
+          <a:ext cx="0" cy="0"/>
+          <a:chOff x="0" y="0"/>
+          <a:chExt cx="0" cy="0"/>
+        </a:xfrm>
+      </p:grpSpPr>
+      <p:sp>
+        <p:nvSpPr>
+          <p:cNvPr id="4" name="TextBox 3"/>
+          <p:cNvSpPr txBox="1"/>
+          <p:nvPr/>
+        </p:nvSpPr>
+        <p:spPr>
+          <a:xfrm>
+            <a:off x="685800" y="128885"/>
+            <a:ext cx="2475358" cy="461665"/>
+          </a:xfrm>
+          <a:prstGeom prst="rect">
+            <a:avLst/>
+          </a:prstGeom>
+          <a:noFill/>
+        </p:spPr>
+        <p:txBody>
+          <a:bodyPr wrap="none" rtlCol="0">
+            <a:spAutoFit/>
+          </a:bodyPr>
+          <a:lstStyle/>
+          <a:p>
+            <a:r>
+              <a:rPr lang="en-US" sz="2400" dirty="0" smtClean="0">
+                <a:solidFill>
+                  <a:schemeClr val="bg1"/>
+                </a:solidFill>
+                <a:latin typeface="Bahnschrift Condensed" pitchFamily="34" charset="0"/>
+              </a:rPr>
+              <a:t>Node JS With MongoDB</a:t>
+            </a:r>
+            <a:endParaRPr lang="en-US" sz="2400" dirty="0">
+              <a:solidFill>
+                <a:schemeClr val="bg1"/>
+              </a:solidFill>
+              <a:latin typeface="Bahnschrift Condensed" pitchFamily="34" charset="0"/>
+            </a:endParaRPr>
+          </a:p>
+        </p:txBody>
+      </p:sp>
+      <p:sp>
+        <p:nvSpPr>
+          <p:cNvPr id="6" name="TextBox 5"/>
+          <p:cNvSpPr txBox="1"/>
+          <p:nvPr/>
+        </p:nvSpPr>
+        <p:spPr>
+          <a:xfrm>
+            <a:off x="304800" y="895350"/>
+            <a:ext cx="3345147" cy="738664"/>
+          </a:xfrm>
+          <a:prstGeom prst="rect">
+            <a:avLst/>
+          </a:prstGeom>
+          <a:noFill/>
+        </p:spPr>
+        <p:txBody>
+          <a:bodyPr wrap="none" rtlCol="0">
+            <a:spAutoFit/>
+          </a:bodyPr>
+          <a:lstStyle/>
+          <a:p>
+            <a:r>
+              <a:rPr lang="en-US" sz="2400" dirty="0" smtClean="0">
+                <a:latin typeface="Bahnschrift Condensed" pitchFamily="34" charset="0"/>
+              </a:rPr>
+              <a:t>Find </a:t>
+            </a:r>
+            <a:r>
+              <a:rPr lang="en-US" sz="2400" dirty="0" smtClean="0">
+                <a:latin typeface="Bahnschrift Condensed" pitchFamily="34" charset="0"/>
+              </a:rPr>
+              <a:t>Data : </a:t>
+            </a:r>
+            <a:endParaRPr lang="en-US" dirty="0" smtClean="0">
+              <a:latin typeface="Bahnschrift Condensed" pitchFamily="34" charset="0"/>
+            </a:endParaRPr>
+          </a:p>
           <a:p>
             <a:pPr marL="285750" indent="-285750">
               <a:buFont typeface="Arial" pitchFamily="34" charset="0"/>
               <a:buChar char="•"/>
             </a:pPr>
             <a:r>
+              <a:rPr lang="en-US" b="1" dirty="0" err="1"/>
+              <a:t>findOne</a:t>
+            </a:r>
+            <a:r>
               <a:rPr lang="en-US" b="1" dirty="0" smtClean="0"/>
-              <a:t>find</a:t>
-            </a:r>
-            <a:r>
-              <a:rPr lang="en-US" b="1" dirty="0"/>
               <a:t>() </a:t>
             </a:r>
             <a:r>
               <a:rPr lang="en-US" dirty="0" smtClean="0"/>
-              <a:t>to select all</a:t>
-            </a:r>
-            <a:endParaRPr lang="en-US" dirty="0" smtClean="0"/>
-          </a:p>
-          <a:p>
-            <a:endParaRPr lang="en-US" sz="2400" dirty="0" smtClean="0">
-              <a:latin typeface="Bahnschrift Condensed" pitchFamily="34" charset="0"/>
-            </a:endParaRPr>
-          </a:p>
-        </p:txBody>
-      </p:sp>
+              <a:t>to select one object </a:t>
+            </a:r>
+          </a:p>
+        </p:txBody>
+      </p:sp>
+      <p:pic>
+        <p:nvPicPr>
+          <p:cNvPr id="2050" name="Picture 2"/>
+          <p:cNvPicPr>
+            <a:picLocks noChangeAspect="1" noChangeArrowheads="1"/>
+          </p:cNvPicPr>
+          <p:nvPr/>
+        </p:nvPicPr>
+        <p:blipFill>
+          <a:blip r:embed="rId3">
+            <a:extLst>
+              <a:ext uri="{28A0092B-C50C-407E-A947-70E740481C1C}">
+                <a14:useLocalDpi xmlns:a14="http://schemas.microsoft.com/office/drawing/2010/main" val="0"/>
+              </a:ext>
+            </a:extLst>
+          </a:blip>
+          <a:srcRect/>
+          <a:stretch>
+            <a:fillRect/>
+          </a:stretch>
+        </p:blipFill>
+        <p:spPr bwMode="auto">
+          <a:xfrm>
+            <a:off x="361783" y="1655604"/>
+            <a:ext cx="5627730" cy="3305175"/>
+          </a:xfrm>
+          <a:prstGeom prst="rect">
+            <a:avLst/>
+          </a:prstGeom>
+          <a:noFill/>
+          <a:ln>
+            <a:noFill/>
+          </a:ln>
+          <a:effectLst/>
+          <a:extLst>
+            <a:ext uri="{909E8E84-426E-40DD-AFC4-6F175D3DCCD1}">
+              <a14:hiddenFill xmlns:a14="http://schemas.microsoft.com/office/drawing/2010/main">
+                <a:solidFill>
+                  <a:schemeClr val="accent1"/>
+                </a:solidFill>
+              </a14:hiddenFill>
+            </a:ext>
+            <a:ext uri="{91240B29-F687-4F45-9708-019B960494DF}">
+              <a14:hiddenLine xmlns:a14="http://schemas.microsoft.com/office/drawing/2010/main" w="9525">
+                <a:solidFill>
+                  <a:schemeClr val="tx1"/>
+                </a:solidFill>
+                <a:miter lim="800000"/>
+                <a:headEnd/>
+                <a:tailEnd/>
+              </a14:hiddenLine>
+            </a:ext>
+            <a:ext uri="{AF507438-7753-43E0-B8FC-AC1667EBCBE1}">
+              <a14:hiddenEffects xmlns:a14="http://schemas.microsoft.com/office/drawing/2010/main">
+                <a:effectLst>
+                  <a:outerShdw dist="35921" dir="2700000" algn="ctr" rotWithShape="0">
+                    <a:schemeClr val="bg2"/>
+                  </a:outerShdw>
+                </a:effectLst>
+              </a14:hiddenEffects>
+            </a:ext>
+          </a:extLst>
+        </p:spPr>
+      </p:pic>
     </p:spTree>
     <p:extLst>
       <p:ext uri="{BB962C8B-B14F-4D97-AF65-F5344CB8AC3E}">
-        <p14:creationId xmlns:p14="http://schemas.microsoft.com/office/powerpoint/2010/main" val="2594880422"/>
+        <p14:creationId xmlns:p14="http://schemas.microsoft.com/office/powerpoint/2010/main" val="3849734801"/>
+      </p:ext>
+    </p:extLst>
+  </p:cSld>
+  <p:clrMapOvr>
+    <a:masterClrMapping/>
+  </p:clrMapOvr>
+  <p:timing>
+    <p:tnLst>
+      <p:par>
+        <p:cTn id="1" dur="indefinite" restart="never" nodeType="tmRoot"/>
+      </p:par>
+    </p:tnLst>
+  </p:timing>
+</p:sld>
+</file>
+
+<file path=ppt/slides/slide13.xml><?xml version="1.0" encoding="utf-8"?>
+<p:sld xmlns:a="http://schemas.openxmlformats.org/drawingml/2006/main" xmlns:r="http://schemas.openxmlformats.org/officeDocument/2006/relationships" xmlns:p="http://schemas.openxmlformats.org/presentationml/2006/main">
+  <p:cSld>
+    <p:bg>
+      <p:bgPr>
+        <a:blipFill dpi="0" rotWithShape="1">
+          <a:blip r:embed="rId2">
+            <a:lum/>
+          </a:blip>
+          <a:srcRect/>
+          <a:stretch>
+            <a:fillRect/>
+          </a:stretch>
+        </a:blipFill>
+        <a:effectLst/>
+      </p:bgPr>
+    </p:bg>
+    <p:spTree>
+      <p:nvGrpSpPr>
+        <p:cNvPr id="1" name=""/>
+        <p:cNvGrpSpPr/>
+        <p:nvPr/>
+      </p:nvGrpSpPr>
+      <p:grpSpPr>
+        <a:xfrm>
+          <a:off x="0" y="0"/>
+          <a:ext cx="0" cy="0"/>
+          <a:chOff x="0" y="0"/>
+          <a:chExt cx="0" cy="0"/>
+        </a:xfrm>
+      </p:grpSpPr>
+      <p:sp>
+        <p:nvSpPr>
+          <p:cNvPr id="4" name="TextBox 3"/>
+          <p:cNvSpPr txBox="1"/>
+          <p:nvPr/>
+        </p:nvSpPr>
+        <p:spPr>
+          <a:xfrm>
+            <a:off x="685800" y="128885"/>
+            <a:ext cx="2475358" cy="461665"/>
+          </a:xfrm>
+          <a:prstGeom prst="rect">
+            <a:avLst/>
+          </a:prstGeom>
+          <a:noFill/>
+        </p:spPr>
+        <p:txBody>
+          <a:bodyPr wrap="none" rtlCol="0">
+            <a:spAutoFit/>
+          </a:bodyPr>
+          <a:lstStyle/>
+          <a:p>
+            <a:r>
+              <a:rPr lang="en-US" sz="2400" dirty="0" smtClean="0">
+                <a:solidFill>
+                  <a:schemeClr val="bg1"/>
+                </a:solidFill>
+                <a:latin typeface="Bahnschrift Condensed" pitchFamily="34" charset="0"/>
+              </a:rPr>
+              <a:t>Node JS With MongoDB</a:t>
+            </a:r>
+            <a:endParaRPr lang="en-US" sz="2400" dirty="0">
+              <a:solidFill>
+                <a:schemeClr val="bg1"/>
+              </a:solidFill>
+              <a:latin typeface="Bahnschrift Condensed" pitchFamily="34" charset="0"/>
+            </a:endParaRPr>
+          </a:p>
+        </p:txBody>
+      </p:sp>
+      <p:sp>
+        <p:nvSpPr>
+          <p:cNvPr id="6" name="TextBox 5"/>
+          <p:cNvSpPr txBox="1"/>
+          <p:nvPr/>
+        </p:nvSpPr>
+        <p:spPr>
+          <a:xfrm>
+            <a:off x="304800" y="895350"/>
+            <a:ext cx="3003707" cy="738664"/>
+          </a:xfrm>
+          <a:prstGeom prst="rect">
+            <a:avLst/>
+          </a:prstGeom>
+          <a:noFill/>
+        </p:spPr>
+        <p:txBody>
+          <a:bodyPr wrap="none" rtlCol="0">
+            <a:spAutoFit/>
+          </a:bodyPr>
+          <a:lstStyle/>
+          <a:p>
+            <a:r>
+              <a:rPr lang="en-US" sz="2400" dirty="0" smtClean="0">
+                <a:latin typeface="Bahnschrift Condensed" pitchFamily="34" charset="0"/>
+              </a:rPr>
+              <a:t>Find </a:t>
+            </a:r>
+            <a:r>
+              <a:rPr lang="en-US" sz="2400" dirty="0" smtClean="0">
+                <a:latin typeface="Bahnschrift Condensed" pitchFamily="34" charset="0"/>
+              </a:rPr>
+              <a:t>Data : </a:t>
+            </a:r>
+            <a:endParaRPr lang="en-US" dirty="0" smtClean="0">
+              <a:latin typeface="Bahnschrift Condensed" pitchFamily="34" charset="0"/>
+            </a:endParaRPr>
+          </a:p>
+          <a:p>
+            <a:pPr marL="285750" indent="-285750">
+              <a:buFont typeface="Arial" pitchFamily="34" charset="0"/>
+              <a:buChar char="•"/>
+            </a:pPr>
+            <a:r>
+              <a:rPr lang="en-US" b="1" dirty="0" smtClean="0"/>
+              <a:t>find () </a:t>
+            </a:r>
+            <a:r>
+              <a:rPr lang="en-US" dirty="0" smtClean="0"/>
+              <a:t>to select one object </a:t>
+            </a:r>
+          </a:p>
+        </p:txBody>
+      </p:sp>
+      <p:pic>
+        <p:nvPicPr>
+          <p:cNvPr id="3074" name="Picture 2"/>
+          <p:cNvPicPr>
+            <a:picLocks noChangeAspect="1" noChangeArrowheads="1"/>
+          </p:cNvPicPr>
+          <p:nvPr/>
+        </p:nvPicPr>
+        <p:blipFill>
+          <a:blip r:embed="rId3">
+            <a:extLst>
+              <a:ext uri="{28A0092B-C50C-407E-A947-70E740481C1C}">
+                <a14:useLocalDpi xmlns:a14="http://schemas.microsoft.com/office/drawing/2010/main" val="0"/>
+              </a:ext>
+            </a:extLst>
+          </a:blip>
+          <a:srcRect/>
+          <a:stretch>
+            <a:fillRect/>
+          </a:stretch>
+        </p:blipFill>
+        <p:spPr bwMode="auto">
+          <a:xfrm>
+            <a:off x="350225" y="1659890"/>
+            <a:ext cx="7048500" cy="1866900"/>
+          </a:xfrm>
+          <a:prstGeom prst="rect">
+            <a:avLst/>
+          </a:prstGeom>
+          <a:noFill/>
+          <a:ln>
+            <a:noFill/>
+          </a:ln>
+          <a:effectLst/>
+          <a:extLst>
+            <a:ext uri="{909E8E84-426E-40DD-AFC4-6F175D3DCCD1}">
+              <a14:hiddenFill xmlns:a14="http://schemas.microsoft.com/office/drawing/2010/main">
+                <a:solidFill>
+                  <a:schemeClr val="accent1"/>
+                </a:solidFill>
+              </a14:hiddenFill>
+            </a:ext>
+            <a:ext uri="{91240B29-F687-4F45-9708-019B960494DF}">
+              <a14:hiddenLine xmlns:a14="http://schemas.microsoft.com/office/drawing/2010/main" w="9525">
+                <a:solidFill>
+                  <a:schemeClr val="tx1"/>
+                </a:solidFill>
+                <a:miter lim="800000"/>
+                <a:headEnd/>
+                <a:tailEnd/>
+              </a14:hiddenLine>
+            </a:ext>
+            <a:ext uri="{AF507438-7753-43E0-B8FC-AC1667EBCBE1}">
+              <a14:hiddenEffects xmlns:a14="http://schemas.microsoft.com/office/drawing/2010/main">
+                <a:effectLst>
+                  <a:outerShdw dist="35921" dir="2700000" algn="ctr" rotWithShape="0">
+                    <a:schemeClr val="bg2"/>
+                  </a:outerShdw>
+                </a:effectLst>
+              </a14:hiddenEffects>
+            </a:ext>
+          </a:extLst>
+        </p:spPr>
+      </p:pic>
+    </p:spTree>
+    <p:extLst>
+      <p:ext uri="{BB962C8B-B14F-4D97-AF65-F5344CB8AC3E}">
+        <p14:creationId xmlns:p14="http://schemas.microsoft.com/office/powerpoint/2010/main" val="1128334689"/>
+      </p:ext>
+    </p:extLst>
+  </p:cSld>
+  <p:clrMapOvr>
+    <a:masterClrMapping/>
+  </p:clrMapOvr>
+  <p:timing>
+    <p:tnLst>
+      <p:par>
+        <p:cTn id="1" dur="indefinite" restart="never" nodeType="tmRoot"/>
+      </p:par>
+    </p:tnLst>
+  </p:timing>
+</p:sld>
+</file>
+
+<file path=ppt/slides/slide14.xml><?xml version="1.0" encoding="utf-8"?>
+<p:sld xmlns:a="http://schemas.openxmlformats.org/drawingml/2006/main" xmlns:r="http://schemas.openxmlformats.org/officeDocument/2006/relationships" xmlns:p="http://schemas.openxmlformats.org/presentationml/2006/main">
+  <p:cSld>
+    <p:bg>
+      <p:bgPr>
+        <a:blipFill dpi="0" rotWithShape="1">
+          <a:blip r:embed="rId2">
+            <a:lum/>
+          </a:blip>
+          <a:srcRect/>
+          <a:stretch>
+            <a:fillRect/>
+          </a:stretch>
+        </a:blipFill>
+        <a:effectLst/>
+      </p:bgPr>
+    </p:bg>
+    <p:spTree>
+      <p:nvGrpSpPr>
+        <p:cNvPr id="1" name=""/>
+        <p:cNvGrpSpPr/>
+        <p:nvPr/>
+      </p:nvGrpSpPr>
+      <p:grpSpPr>
+        <a:xfrm>
+          <a:off x="0" y="0"/>
+          <a:ext cx="0" cy="0"/>
+          <a:chOff x="0" y="0"/>
+          <a:chExt cx="0" cy="0"/>
+        </a:xfrm>
+      </p:grpSpPr>
+      <p:sp>
+        <p:nvSpPr>
+          <p:cNvPr id="4" name="TextBox 3"/>
+          <p:cNvSpPr txBox="1"/>
+          <p:nvPr/>
+        </p:nvSpPr>
+        <p:spPr>
+          <a:xfrm>
+            <a:off x="685800" y="128885"/>
+            <a:ext cx="2475358" cy="461665"/>
+          </a:xfrm>
+          <a:prstGeom prst="rect">
+            <a:avLst/>
+          </a:prstGeom>
+          <a:noFill/>
+        </p:spPr>
+        <p:txBody>
+          <a:bodyPr wrap="none" rtlCol="0">
+            <a:spAutoFit/>
+          </a:bodyPr>
+          <a:lstStyle/>
+          <a:p>
+            <a:r>
+              <a:rPr lang="en-US" sz="2400" dirty="0" smtClean="0">
+                <a:solidFill>
+                  <a:schemeClr val="bg1"/>
+                </a:solidFill>
+                <a:latin typeface="Bahnschrift Condensed" pitchFamily="34" charset="0"/>
+              </a:rPr>
+              <a:t>Node JS With MongoDB</a:t>
+            </a:r>
+            <a:endParaRPr lang="en-US" sz="2400" dirty="0">
+              <a:solidFill>
+                <a:schemeClr val="bg1"/>
+              </a:solidFill>
+              <a:latin typeface="Bahnschrift Condensed" pitchFamily="34" charset="0"/>
+            </a:endParaRPr>
+          </a:p>
+        </p:txBody>
+      </p:sp>
+      <p:sp>
+        <p:nvSpPr>
+          <p:cNvPr id="6" name="TextBox 5"/>
+          <p:cNvSpPr txBox="1"/>
+          <p:nvPr/>
+        </p:nvSpPr>
+        <p:spPr>
+          <a:xfrm>
+            <a:off x="304800" y="895350"/>
+            <a:ext cx="2910861" cy="738664"/>
+          </a:xfrm>
+          <a:prstGeom prst="rect">
+            <a:avLst/>
+          </a:prstGeom>
+          <a:noFill/>
+        </p:spPr>
+        <p:txBody>
+          <a:bodyPr wrap="none" rtlCol="0">
+            <a:spAutoFit/>
+          </a:bodyPr>
+          <a:lstStyle/>
+          <a:p>
+            <a:r>
+              <a:rPr lang="en-US" sz="2400" dirty="0" smtClean="0">
+                <a:latin typeface="Bahnschrift Condensed" pitchFamily="34" charset="0"/>
+              </a:rPr>
+              <a:t>Find </a:t>
+            </a:r>
+            <a:r>
+              <a:rPr lang="en-US" sz="2400" dirty="0" smtClean="0">
+                <a:latin typeface="Bahnschrift Condensed" pitchFamily="34" charset="0"/>
+              </a:rPr>
+              <a:t>Data : </a:t>
+            </a:r>
+            <a:endParaRPr lang="en-US" dirty="0" smtClean="0">
+              <a:latin typeface="Bahnschrift Condensed" pitchFamily="34" charset="0"/>
+            </a:endParaRPr>
+          </a:p>
+          <a:p>
+            <a:pPr marL="285750" indent="-285750">
+              <a:buFont typeface="Arial" pitchFamily="34" charset="0"/>
+              <a:buChar char="•"/>
+            </a:pPr>
+            <a:r>
+              <a:rPr lang="en-US" b="1" dirty="0" smtClean="0"/>
+              <a:t>find () </a:t>
+            </a:r>
+            <a:r>
+              <a:rPr lang="en-US" dirty="0" smtClean="0"/>
+              <a:t>with </a:t>
+            </a:r>
+            <a:r>
+              <a:rPr lang="en-US" dirty="0" err="1" smtClean="0"/>
+              <a:t>projectsection</a:t>
+            </a:r>
+            <a:endParaRPr lang="en-US" dirty="0" smtClean="0"/>
+          </a:p>
+        </p:txBody>
+      </p:sp>
+      <p:pic>
+        <p:nvPicPr>
+          <p:cNvPr id="4098" name="Picture 2"/>
+          <p:cNvPicPr>
+            <a:picLocks noChangeAspect="1" noChangeArrowheads="1"/>
+          </p:cNvPicPr>
+          <p:nvPr/>
+        </p:nvPicPr>
+        <p:blipFill>
+          <a:blip r:embed="rId3">
+            <a:extLst>
+              <a:ext uri="{28A0092B-C50C-407E-A947-70E740481C1C}">
+                <a14:useLocalDpi xmlns:a14="http://schemas.microsoft.com/office/drawing/2010/main" val="0"/>
+              </a:ext>
+            </a:extLst>
+          </a:blip>
+          <a:srcRect/>
+          <a:stretch>
+            <a:fillRect/>
+          </a:stretch>
+        </p:blipFill>
+        <p:spPr bwMode="auto">
+          <a:xfrm>
+            <a:off x="304800" y="1800436"/>
+            <a:ext cx="8718550" cy="2794000"/>
+          </a:xfrm>
+          <a:prstGeom prst="rect">
+            <a:avLst/>
+          </a:prstGeom>
+          <a:noFill/>
+          <a:ln>
+            <a:noFill/>
+          </a:ln>
+          <a:effectLst/>
+          <a:extLst>
+            <a:ext uri="{909E8E84-426E-40DD-AFC4-6F175D3DCCD1}">
+              <a14:hiddenFill xmlns:a14="http://schemas.microsoft.com/office/drawing/2010/main">
+                <a:solidFill>
+                  <a:schemeClr val="accent1"/>
+                </a:solidFill>
+              </a14:hiddenFill>
+            </a:ext>
+            <a:ext uri="{91240B29-F687-4F45-9708-019B960494DF}">
+              <a14:hiddenLine xmlns:a14="http://schemas.microsoft.com/office/drawing/2010/main" w="9525">
+                <a:solidFill>
+                  <a:schemeClr val="tx1"/>
+                </a:solidFill>
+                <a:miter lim="800000"/>
+                <a:headEnd/>
+                <a:tailEnd/>
+              </a14:hiddenLine>
+            </a:ext>
+            <a:ext uri="{AF507438-7753-43E0-B8FC-AC1667EBCBE1}">
+              <a14:hiddenEffects xmlns:a14="http://schemas.microsoft.com/office/drawing/2010/main">
+                <a:effectLst>
+                  <a:outerShdw dist="35921" dir="2700000" algn="ctr" rotWithShape="0">
+                    <a:schemeClr val="bg2"/>
+                  </a:outerShdw>
+                </a:effectLst>
+              </a14:hiddenEffects>
+            </a:ext>
+          </a:extLst>
+        </p:spPr>
+      </p:pic>
+    </p:spTree>
+    <p:extLst>
+      <p:ext uri="{BB962C8B-B14F-4D97-AF65-F5344CB8AC3E}">
+        <p14:creationId xmlns:p14="http://schemas.microsoft.com/office/powerpoint/2010/main" val="783567734"/>
+      </p:ext>
+    </p:extLst>
+  </p:cSld>
+  <p:clrMapOvr>
+    <a:masterClrMapping/>
+  </p:clrMapOvr>
+  <p:timing>
+    <p:tnLst>
+      <p:par>
+        <p:cTn id="1" dur="indefinite" restart="never" nodeType="tmRoot"/>
+      </p:par>
+    </p:tnLst>
+  </p:timing>
+</p:sld>
+</file>
+
+<file path=ppt/slides/slide15.xml><?xml version="1.0" encoding="utf-8"?>
+<p:sld xmlns:a="http://schemas.openxmlformats.org/drawingml/2006/main" xmlns:r="http://schemas.openxmlformats.org/officeDocument/2006/relationships" xmlns:p="http://schemas.openxmlformats.org/presentationml/2006/main">
+  <p:cSld>
+    <p:bg>
+      <p:bgPr>
+        <a:blipFill dpi="0" rotWithShape="1">
+          <a:blip r:embed="rId2">
+            <a:lum/>
+          </a:blip>
+          <a:srcRect/>
+          <a:stretch>
+            <a:fillRect/>
+          </a:stretch>
+        </a:blipFill>
+        <a:effectLst/>
+      </p:bgPr>
+    </p:bg>
+    <p:spTree>
+      <p:nvGrpSpPr>
+        <p:cNvPr id="1" name=""/>
+        <p:cNvGrpSpPr/>
+        <p:nvPr/>
+      </p:nvGrpSpPr>
+      <p:grpSpPr>
+        <a:xfrm>
+          <a:off x="0" y="0"/>
+          <a:ext cx="0" cy="0"/>
+          <a:chOff x="0" y="0"/>
+          <a:chExt cx="0" cy="0"/>
+        </a:xfrm>
+      </p:grpSpPr>
+      <p:sp>
+        <p:nvSpPr>
+          <p:cNvPr id="4" name="TextBox 3"/>
+          <p:cNvSpPr txBox="1"/>
+          <p:nvPr/>
+        </p:nvSpPr>
+        <p:spPr>
+          <a:xfrm>
+            <a:off x="685800" y="128885"/>
+            <a:ext cx="2475358" cy="461665"/>
+          </a:xfrm>
+          <a:prstGeom prst="rect">
+            <a:avLst/>
+          </a:prstGeom>
+          <a:noFill/>
+        </p:spPr>
+        <p:txBody>
+          <a:bodyPr wrap="none" rtlCol="0">
+            <a:spAutoFit/>
+          </a:bodyPr>
+          <a:lstStyle/>
+          <a:p>
+            <a:r>
+              <a:rPr lang="en-US" sz="2400" dirty="0" smtClean="0">
+                <a:solidFill>
+                  <a:schemeClr val="bg1"/>
+                </a:solidFill>
+                <a:latin typeface="Bahnschrift Condensed" pitchFamily="34" charset="0"/>
+              </a:rPr>
+              <a:t>Node JS With MongoDB</a:t>
+            </a:r>
+            <a:endParaRPr lang="en-US" sz="2400" dirty="0">
+              <a:solidFill>
+                <a:schemeClr val="bg1"/>
+              </a:solidFill>
+              <a:latin typeface="Bahnschrift Condensed" pitchFamily="34" charset="0"/>
+            </a:endParaRPr>
+          </a:p>
+        </p:txBody>
+      </p:sp>
+      <p:sp>
+        <p:nvSpPr>
+          <p:cNvPr id="6" name="TextBox 5"/>
+          <p:cNvSpPr txBox="1"/>
+          <p:nvPr/>
+        </p:nvSpPr>
+        <p:spPr>
+          <a:xfrm>
+            <a:off x="304800" y="895350"/>
+            <a:ext cx="2167132" cy="738664"/>
+          </a:xfrm>
+          <a:prstGeom prst="rect">
+            <a:avLst/>
+          </a:prstGeom>
+          <a:noFill/>
+        </p:spPr>
+        <p:txBody>
+          <a:bodyPr wrap="none" rtlCol="0">
+            <a:spAutoFit/>
+          </a:bodyPr>
+          <a:lstStyle/>
+          <a:p>
+            <a:r>
+              <a:rPr lang="en-US" sz="2400" dirty="0" smtClean="0">
+                <a:latin typeface="Bahnschrift Condensed" pitchFamily="34" charset="0"/>
+              </a:rPr>
+              <a:t>Find </a:t>
+            </a:r>
+            <a:r>
+              <a:rPr lang="en-US" sz="2400" dirty="0" smtClean="0">
+                <a:latin typeface="Bahnschrift Condensed" pitchFamily="34" charset="0"/>
+              </a:rPr>
+              <a:t>Data : </a:t>
+            </a:r>
+            <a:endParaRPr lang="en-US" dirty="0" smtClean="0">
+              <a:latin typeface="Bahnschrift Condensed" pitchFamily="34" charset="0"/>
+            </a:endParaRPr>
+          </a:p>
+          <a:p>
+            <a:pPr marL="285750" indent="-285750">
+              <a:buFont typeface="Arial" pitchFamily="34" charset="0"/>
+              <a:buChar char="•"/>
+            </a:pPr>
+            <a:r>
+              <a:rPr lang="en-US" b="1" dirty="0" smtClean="0"/>
+              <a:t>find () </a:t>
+            </a:r>
+            <a:r>
+              <a:rPr lang="en-US" dirty="0" smtClean="0"/>
+              <a:t>with query </a:t>
+            </a:r>
+            <a:endParaRPr lang="en-US" dirty="0" smtClean="0"/>
+          </a:p>
+        </p:txBody>
+      </p:sp>
+      <p:pic>
+        <p:nvPicPr>
+          <p:cNvPr id="5122" name="Picture 2"/>
+          <p:cNvPicPr>
+            <a:picLocks noChangeAspect="1" noChangeArrowheads="1"/>
+          </p:cNvPicPr>
+          <p:nvPr/>
+        </p:nvPicPr>
+        <p:blipFill>
+          <a:blip r:embed="rId3">
+            <a:extLst>
+              <a:ext uri="{28A0092B-C50C-407E-A947-70E740481C1C}">
+                <a14:useLocalDpi xmlns:a14="http://schemas.microsoft.com/office/drawing/2010/main" val="0"/>
+              </a:ext>
+            </a:extLst>
+          </a:blip>
+          <a:srcRect/>
+          <a:stretch>
+            <a:fillRect/>
+          </a:stretch>
+        </p:blipFill>
+        <p:spPr bwMode="auto">
+          <a:xfrm>
+            <a:off x="457200" y="1733550"/>
+            <a:ext cx="7175500" cy="2667000"/>
+          </a:xfrm>
+          <a:prstGeom prst="rect">
+            <a:avLst/>
+          </a:prstGeom>
+          <a:noFill/>
+          <a:ln>
+            <a:noFill/>
+          </a:ln>
+          <a:effectLst/>
+          <a:extLst>
+            <a:ext uri="{909E8E84-426E-40DD-AFC4-6F175D3DCCD1}">
+              <a14:hiddenFill xmlns:a14="http://schemas.microsoft.com/office/drawing/2010/main">
+                <a:solidFill>
+                  <a:schemeClr val="accent1"/>
+                </a:solidFill>
+              </a14:hiddenFill>
+            </a:ext>
+            <a:ext uri="{91240B29-F687-4F45-9708-019B960494DF}">
+              <a14:hiddenLine xmlns:a14="http://schemas.microsoft.com/office/drawing/2010/main" w="9525">
+                <a:solidFill>
+                  <a:schemeClr val="tx1"/>
+                </a:solidFill>
+                <a:miter lim="800000"/>
+                <a:headEnd/>
+                <a:tailEnd/>
+              </a14:hiddenLine>
+            </a:ext>
+            <a:ext uri="{AF507438-7753-43E0-B8FC-AC1667EBCBE1}">
+              <a14:hiddenEffects xmlns:a14="http://schemas.microsoft.com/office/drawing/2010/main">
+                <a:effectLst>
+                  <a:outerShdw dist="35921" dir="2700000" algn="ctr" rotWithShape="0">
+                    <a:schemeClr val="bg2"/>
+                  </a:outerShdw>
+                </a:effectLst>
+              </a14:hiddenEffects>
+            </a:ext>
+          </a:extLst>
+        </p:spPr>
+      </p:pic>
+    </p:spTree>
+    <p:extLst>
+      <p:ext uri="{BB962C8B-B14F-4D97-AF65-F5344CB8AC3E}">
+        <p14:creationId xmlns:p14="http://schemas.microsoft.com/office/powerpoint/2010/main" val="1653038709"/>
+      </p:ext>
+    </p:extLst>
+  </p:cSld>
+  <p:clrMapOvr>
+    <a:masterClrMapping/>
+  </p:clrMapOvr>
+  <p:timing>
+    <p:tnLst>
+      <p:par>
+        <p:cTn id="1" dur="indefinite" restart="never" nodeType="tmRoot"/>
+      </p:par>
+    </p:tnLst>
+  </p:timing>
+</p:sld>
+</file>
+
+<file path=ppt/slides/slide16.xml><?xml version="1.0" encoding="utf-8"?>
+<p:sld xmlns:a="http://schemas.openxmlformats.org/drawingml/2006/main" xmlns:r="http://schemas.openxmlformats.org/officeDocument/2006/relationships" xmlns:p="http://schemas.openxmlformats.org/presentationml/2006/main">
+  <p:cSld>
+    <p:bg>
+      <p:bgPr>
+        <a:blipFill dpi="0" rotWithShape="1">
+          <a:blip r:embed="rId2">
+            <a:lum/>
+          </a:blip>
+          <a:srcRect/>
+          <a:stretch>
+            <a:fillRect/>
+          </a:stretch>
+        </a:blipFill>
+        <a:effectLst/>
+      </p:bgPr>
+    </p:bg>
+    <p:spTree>
+      <p:nvGrpSpPr>
+        <p:cNvPr id="1" name=""/>
+        <p:cNvGrpSpPr/>
+        <p:nvPr/>
+      </p:nvGrpSpPr>
+      <p:grpSpPr>
+        <a:xfrm>
+          <a:off x="0" y="0"/>
+          <a:ext cx="0" cy="0"/>
+          <a:chOff x="0" y="0"/>
+          <a:chExt cx="0" cy="0"/>
+        </a:xfrm>
+      </p:grpSpPr>
+      <p:sp>
+        <p:nvSpPr>
+          <p:cNvPr id="4" name="TextBox 3"/>
+          <p:cNvSpPr txBox="1"/>
+          <p:nvPr/>
+        </p:nvSpPr>
+        <p:spPr>
+          <a:xfrm>
+            <a:off x="685800" y="128885"/>
+            <a:ext cx="2475358" cy="461665"/>
+          </a:xfrm>
+          <a:prstGeom prst="rect">
+            <a:avLst/>
+          </a:prstGeom>
+          <a:noFill/>
+        </p:spPr>
+        <p:txBody>
+          <a:bodyPr wrap="none" rtlCol="0">
+            <a:spAutoFit/>
+          </a:bodyPr>
+          <a:lstStyle/>
+          <a:p>
+            <a:r>
+              <a:rPr lang="en-US" sz="2400" dirty="0" smtClean="0">
+                <a:solidFill>
+                  <a:schemeClr val="bg1"/>
+                </a:solidFill>
+                <a:latin typeface="Bahnschrift Condensed" pitchFamily="34" charset="0"/>
+              </a:rPr>
+              <a:t>Node JS With MongoDB</a:t>
+            </a:r>
+            <a:endParaRPr lang="en-US" sz="2400" dirty="0">
+              <a:solidFill>
+                <a:schemeClr val="bg1"/>
+              </a:solidFill>
+              <a:latin typeface="Bahnschrift Condensed" pitchFamily="34" charset="0"/>
+            </a:endParaRPr>
+          </a:p>
+        </p:txBody>
+      </p:sp>
+      <p:sp>
+        <p:nvSpPr>
+          <p:cNvPr id="6" name="TextBox 5"/>
+          <p:cNvSpPr txBox="1"/>
+          <p:nvPr/>
+        </p:nvSpPr>
+        <p:spPr>
+          <a:xfrm>
+            <a:off x="304800" y="895350"/>
+            <a:ext cx="2095445" cy="738664"/>
+          </a:xfrm>
+          <a:prstGeom prst="rect">
+            <a:avLst/>
+          </a:prstGeom>
+          <a:noFill/>
+        </p:spPr>
+        <p:txBody>
+          <a:bodyPr wrap="none" rtlCol="0">
+            <a:spAutoFit/>
+          </a:bodyPr>
+          <a:lstStyle/>
+          <a:p>
+            <a:r>
+              <a:rPr lang="en-US" sz="2400" dirty="0" smtClean="0">
+                <a:latin typeface="Bahnschrift Condensed" pitchFamily="34" charset="0"/>
+              </a:rPr>
+              <a:t>Find </a:t>
+            </a:r>
+            <a:r>
+              <a:rPr lang="en-US" sz="2400" dirty="0" smtClean="0">
+                <a:latin typeface="Bahnschrift Condensed" pitchFamily="34" charset="0"/>
+              </a:rPr>
+              <a:t>Data : </a:t>
+            </a:r>
+            <a:endParaRPr lang="en-US" dirty="0" smtClean="0">
+              <a:latin typeface="Bahnschrift Condensed" pitchFamily="34" charset="0"/>
+            </a:endParaRPr>
+          </a:p>
+          <a:p>
+            <a:pPr marL="285750" indent="-285750">
+              <a:buFont typeface="Arial" pitchFamily="34" charset="0"/>
+              <a:buChar char="•"/>
+            </a:pPr>
+            <a:r>
+              <a:rPr lang="en-US" b="1" dirty="0" smtClean="0"/>
+              <a:t>find () </a:t>
+            </a:r>
+            <a:r>
+              <a:rPr lang="en-US" dirty="0" smtClean="0"/>
+              <a:t>with limit  </a:t>
+            </a:r>
+            <a:endParaRPr lang="en-US" dirty="0" smtClean="0"/>
+          </a:p>
+        </p:txBody>
+      </p:sp>
+      <p:pic>
+        <p:nvPicPr>
+          <p:cNvPr id="6146" name="Picture 2"/>
+          <p:cNvPicPr>
+            <a:picLocks noChangeAspect="1" noChangeArrowheads="1"/>
+          </p:cNvPicPr>
+          <p:nvPr/>
+        </p:nvPicPr>
+        <p:blipFill>
+          <a:blip r:embed="rId3">
+            <a:extLst>
+              <a:ext uri="{28A0092B-C50C-407E-A947-70E740481C1C}">
+                <a14:useLocalDpi xmlns:a14="http://schemas.microsoft.com/office/drawing/2010/main" val="0"/>
+              </a:ext>
+            </a:extLst>
+          </a:blip>
+          <a:srcRect/>
+          <a:stretch>
+            <a:fillRect/>
+          </a:stretch>
+        </p:blipFill>
+        <p:spPr bwMode="auto">
+          <a:xfrm>
+            <a:off x="328507" y="1809750"/>
+            <a:ext cx="7931150" cy="2082800"/>
+          </a:xfrm>
+          <a:prstGeom prst="rect">
+            <a:avLst/>
+          </a:prstGeom>
+          <a:noFill/>
+          <a:ln>
+            <a:noFill/>
+          </a:ln>
+          <a:effectLst/>
+          <a:extLst>
+            <a:ext uri="{909E8E84-426E-40DD-AFC4-6F175D3DCCD1}">
+              <a14:hiddenFill xmlns:a14="http://schemas.microsoft.com/office/drawing/2010/main">
+                <a:solidFill>
+                  <a:schemeClr val="accent1"/>
+                </a:solidFill>
+              </a14:hiddenFill>
+            </a:ext>
+            <a:ext uri="{91240B29-F687-4F45-9708-019B960494DF}">
+              <a14:hiddenLine xmlns:a14="http://schemas.microsoft.com/office/drawing/2010/main" w="9525">
+                <a:solidFill>
+                  <a:schemeClr val="tx1"/>
+                </a:solidFill>
+                <a:miter lim="800000"/>
+                <a:headEnd/>
+                <a:tailEnd/>
+              </a14:hiddenLine>
+            </a:ext>
+            <a:ext uri="{AF507438-7753-43E0-B8FC-AC1667EBCBE1}">
+              <a14:hiddenEffects xmlns:a14="http://schemas.microsoft.com/office/drawing/2010/main">
+                <a:effectLst>
+                  <a:outerShdw dist="35921" dir="2700000" algn="ctr" rotWithShape="0">
+                    <a:schemeClr val="bg2"/>
+                  </a:outerShdw>
+                </a:effectLst>
+              </a14:hiddenEffects>
+            </a:ext>
+          </a:extLst>
+        </p:spPr>
+      </p:pic>
+    </p:spTree>
+    <p:extLst>
+      <p:ext uri="{BB962C8B-B14F-4D97-AF65-F5344CB8AC3E}">
+        <p14:creationId xmlns:p14="http://schemas.microsoft.com/office/powerpoint/2010/main" val="1497473207"/>
+      </p:ext>
+    </p:extLst>
+  </p:cSld>
+  <p:clrMapOvr>
+    <a:masterClrMapping/>
+  </p:clrMapOvr>
+  <p:timing>
+    <p:tnLst>
+      <p:par>
+        <p:cTn id="1" dur="indefinite" restart="never" nodeType="tmRoot"/>
+      </p:par>
+    </p:tnLst>
+  </p:timing>
+</p:sld>
+</file>
+
+<file path=ppt/slides/slide17.xml><?xml version="1.0" encoding="utf-8"?>
+<p:sld xmlns:a="http://schemas.openxmlformats.org/drawingml/2006/main" xmlns:r="http://schemas.openxmlformats.org/officeDocument/2006/relationships" xmlns:p="http://schemas.openxmlformats.org/presentationml/2006/main">
+  <p:cSld>
+    <p:bg>
+      <p:bgPr>
+        <a:blipFill dpi="0" rotWithShape="1">
+          <a:blip r:embed="rId2">
+            <a:lum/>
+          </a:blip>
+          <a:srcRect/>
+          <a:stretch>
+            <a:fillRect/>
+          </a:stretch>
+        </a:blipFill>
+        <a:effectLst/>
+      </p:bgPr>
+    </p:bg>
+    <p:spTree>
+      <p:nvGrpSpPr>
+        <p:cNvPr id="1" name=""/>
+        <p:cNvGrpSpPr/>
+        <p:nvPr/>
+      </p:nvGrpSpPr>
+      <p:grpSpPr>
+        <a:xfrm>
+          <a:off x="0" y="0"/>
+          <a:ext cx="0" cy="0"/>
+          <a:chOff x="0" y="0"/>
+          <a:chExt cx="0" cy="0"/>
+        </a:xfrm>
+      </p:grpSpPr>
+      <p:sp>
+        <p:nvSpPr>
+          <p:cNvPr id="4" name="TextBox 3"/>
+          <p:cNvSpPr txBox="1"/>
+          <p:nvPr/>
+        </p:nvSpPr>
+        <p:spPr>
+          <a:xfrm>
+            <a:off x="685800" y="128885"/>
+            <a:ext cx="2475358" cy="461665"/>
+          </a:xfrm>
+          <a:prstGeom prst="rect">
+            <a:avLst/>
+          </a:prstGeom>
+          <a:noFill/>
+        </p:spPr>
+        <p:txBody>
+          <a:bodyPr wrap="none" rtlCol="0">
+            <a:spAutoFit/>
+          </a:bodyPr>
+          <a:lstStyle/>
+          <a:p>
+            <a:r>
+              <a:rPr lang="en-US" sz="2400" dirty="0" smtClean="0">
+                <a:solidFill>
+                  <a:schemeClr val="bg1"/>
+                </a:solidFill>
+                <a:latin typeface="Bahnschrift Condensed" pitchFamily="34" charset="0"/>
+              </a:rPr>
+              <a:t>Node JS With MongoDB</a:t>
+            </a:r>
+            <a:endParaRPr lang="en-US" sz="2400" dirty="0">
+              <a:solidFill>
+                <a:schemeClr val="bg1"/>
+              </a:solidFill>
+              <a:latin typeface="Bahnschrift Condensed" pitchFamily="34" charset="0"/>
+            </a:endParaRPr>
+          </a:p>
+        </p:txBody>
+      </p:sp>
+      <p:sp>
+        <p:nvSpPr>
+          <p:cNvPr id="6" name="TextBox 5"/>
+          <p:cNvSpPr txBox="1"/>
+          <p:nvPr/>
+        </p:nvSpPr>
+        <p:spPr>
+          <a:xfrm>
+            <a:off x="304800" y="895350"/>
+            <a:ext cx="1938351" cy="738664"/>
+          </a:xfrm>
+          <a:prstGeom prst="rect">
+            <a:avLst/>
+          </a:prstGeom>
+          <a:noFill/>
+        </p:spPr>
+        <p:txBody>
+          <a:bodyPr wrap="none" rtlCol="0">
+            <a:spAutoFit/>
+          </a:bodyPr>
+          <a:lstStyle/>
+          <a:p>
+            <a:r>
+              <a:rPr lang="en-US" sz="2400" dirty="0" smtClean="0">
+                <a:latin typeface="Bahnschrift Condensed" pitchFamily="34" charset="0"/>
+              </a:rPr>
+              <a:t>Find </a:t>
+            </a:r>
+            <a:r>
+              <a:rPr lang="en-US" sz="2400" dirty="0" smtClean="0">
+                <a:latin typeface="Bahnschrift Condensed" pitchFamily="34" charset="0"/>
+              </a:rPr>
+              <a:t>Data : </a:t>
+            </a:r>
+            <a:endParaRPr lang="en-US" dirty="0" smtClean="0">
+              <a:latin typeface="Bahnschrift Condensed" pitchFamily="34" charset="0"/>
+            </a:endParaRPr>
+          </a:p>
+          <a:p>
+            <a:pPr marL="285750" indent="-285750">
+              <a:buFont typeface="Arial" pitchFamily="34" charset="0"/>
+              <a:buChar char="•"/>
+            </a:pPr>
+            <a:r>
+              <a:rPr lang="en-US" b="1" dirty="0" smtClean="0"/>
+              <a:t>find () </a:t>
+            </a:r>
+            <a:r>
+              <a:rPr lang="en-US" dirty="0" smtClean="0"/>
+              <a:t>with sort</a:t>
+            </a:r>
+            <a:endParaRPr lang="en-US" dirty="0" smtClean="0"/>
+          </a:p>
+        </p:txBody>
+      </p:sp>
+    </p:spTree>
+    <p:extLst>
+      <p:ext uri="{BB962C8B-B14F-4D97-AF65-F5344CB8AC3E}">
+        <p14:creationId xmlns:p14="http://schemas.microsoft.com/office/powerpoint/2010/main" val="1026730170"/>
       </p:ext>
     </p:extLst>
   </p:cSld>

</xml_diff>

<commit_message>
Data Update Create Collection And Delete Collection
Data Update Create Collection And Delete Collection
</commit_message>
<xml_diff>
--- a/PowerPointSlides/13 Node js MongoDB.pptx
+++ b/PowerPointSlides/13 Node js MongoDB.pptx
@@ -22,6 +22,8 @@
     <p:sldId id="273" r:id="rId16"/>
     <p:sldId id="274" r:id="rId17"/>
     <p:sldId id="275" r:id="rId18"/>
+    <p:sldId id="276" r:id="rId19"/>
+    <p:sldId id="277" r:id="rId20"/>
   </p:sldIdLst>
   <p:sldSz cx="9144000" cy="5143500" type="screen16x9"/>
   <p:notesSz cx="6858000" cy="9144000"/>
@@ -305,7 +307,7 @@
             <a:fld id="{1D8BD707-D9CF-40AE-B4C6-C98DA3205C09}" type="datetimeFigureOut">
               <a:rPr lang="en-US" smtClean="0"/>
               <a:pPr/>
-              <a:t>10/13/2020</a:t>
+              <a:t>10/19/2020</a:t>
             </a:fld>
             <a:endParaRPr lang="en-US"/>
           </a:p>
@@ -472,7 +474,7 @@
             <a:fld id="{1D8BD707-D9CF-40AE-B4C6-C98DA3205C09}" type="datetimeFigureOut">
               <a:rPr lang="en-US" smtClean="0"/>
               <a:pPr/>
-              <a:t>10/13/2020</a:t>
+              <a:t>10/19/2020</a:t>
             </a:fld>
             <a:endParaRPr lang="en-US"/>
           </a:p>
@@ -649,7 +651,7 @@
             <a:fld id="{1D8BD707-D9CF-40AE-B4C6-C98DA3205C09}" type="datetimeFigureOut">
               <a:rPr lang="en-US" smtClean="0"/>
               <a:pPr/>
-              <a:t>10/13/2020</a:t>
+              <a:t>10/19/2020</a:t>
             </a:fld>
             <a:endParaRPr lang="en-US"/>
           </a:p>
@@ -816,7 +818,7 @@
             <a:fld id="{1D8BD707-D9CF-40AE-B4C6-C98DA3205C09}" type="datetimeFigureOut">
               <a:rPr lang="en-US" smtClean="0"/>
               <a:pPr/>
-              <a:t>10/13/2020</a:t>
+              <a:t>10/19/2020</a:t>
             </a:fld>
             <a:endParaRPr lang="en-US"/>
           </a:p>
@@ -1059,7 +1061,7 @@
             <a:fld id="{1D8BD707-D9CF-40AE-B4C6-C98DA3205C09}" type="datetimeFigureOut">
               <a:rPr lang="en-US" smtClean="0"/>
               <a:pPr/>
-              <a:t>10/13/2020</a:t>
+              <a:t>10/19/2020</a:t>
             </a:fld>
             <a:endParaRPr lang="en-US"/>
           </a:p>
@@ -1344,7 +1346,7 @@
             <a:fld id="{1D8BD707-D9CF-40AE-B4C6-C98DA3205C09}" type="datetimeFigureOut">
               <a:rPr lang="en-US" smtClean="0"/>
               <a:pPr/>
-              <a:t>10/13/2020</a:t>
+              <a:t>10/19/2020</a:t>
             </a:fld>
             <a:endParaRPr lang="en-US"/>
           </a:p>
@@ -1763,7 +1765,7 @@
             <a:fld id="{1D8BD707-D9CF-40AE-B4C6-C98DA3205C09}" type="datetimeFigureOut">
               <a:rPr lang="en-US" smtClean="0"/>
               <a:pPr/>
-              <a:t>10/13/2020</a:t>
+              <a:t>10/19/2020</a:t>
             </a:fld>
             <a:endParaRPr lang="en-US"/>
           </a:p>
@@ -1878,7 +1880,7 @@
             <a:fld id="{1D8BD707-D9CF-40AE-B4C6-C98DA3205C09}" type="datetimeFigureOut">
               <a:rPr lang="en-US" smtClean="0"/>
               <a:pPr/>
-              <a:t>10/13/2020</a:t>
+              <a:t>10/19/2020</a:t>
             </a:fld>
             <a:endParaRPr lang="en-US"/>
           </a:p>
@@ -1970,7 +1972,7 @@
             <a:fld id="{1D8BD707-D9CF-40AE-B4C6-C98DA3205C09}" type="datetimeFigureOut">
               <a:rPr lang="en-US" smtClean="0"/>
               <a:pPr/>
-              <a:t>10/13/2020</a:t>
+              <a:t>10/19/2020</a:t>
             </a:fld>
             <a:endParaRPr lang="en-US"/>
           </a:p>
@@ -2244,7 +2246,7 @@
             <a:fld id="{1D8BD707-D9CF-40AE-B4C6-C98DA3205C09}" type="datetimeFigureOut">
               <a:rPr lang="en-US" smtClean="0"/>
               <a:pPr/>
-              <a:t>10/13/2020</a:t>
+              <a:t>10/19/2020</a:t>
             </a:fld>
             <a:endParaRPr lang="en-US"/>
           </a:p>
@@ -2494,7 +2496,7 @@
             <a:fld id="{1D8BD707-D9CF-40AE-B4C6-C98DA3205C09}" type="datetimeFigureOut">
               <a:rPr lang="en-US" smtClean="0"/>
               <a:pPr/>
-              <a:t>10/13/2020</a:t>
+              <a:t>10/19/2020</a:t>
             </a:fld>
             <a:endParaRPr lang="en-US"/>
           </a:p>
@@ -2713,7 +2715,7 @@
             <a:fld id="{1D8BD707-D9CF-40AE-B4C6-C98DA3205C09}" type="datetimeFigureOut">
               <a:rPr lang="en-US" smtClean="0"/>
               <a:pPr/>
-              <a:t>10/13/2020</a:t>
+              <a:t>10/19/2020</a:t>
             </a:fld>
             <a:endParaRPr lang="en-US"/>
           </a:p>
@@ -3493,13 +3495,7 @@
               <a:rPr lang="en-US" sz="2400" dirty="0" smtClean="0">
                 <a:latin typeface="Bahnschrift Condensed" pitchFamily="34" charset="0"/>
               </a:rPr>
-              <a:t>Find </a:t>
-            </a:r>
-            <a:r>
-              <a:rPr lang="en-US" sz="2400" dirty="0" smtClean="0">
-                <a:latin typeface="Bahnschrift Condensed" pitchFamily="34" charset="0"/>
-              </a:rPr>
-              <a:t>Data : </a:t>
+              <a:t>Find Data : </a:t>
             </a:r>
             <a:endParaRPr lang="en-US" dirty="0" smtClean="0">
               <a:latin typeface="Bahnschrift Condensed" pitchFamily="34" charset="0"/>
@@ -3706,13 +3702,7 @@
               <a:rPr lang="en-US" sz="2400" dirty="0" smtClean="0">
                 <a:latin typeface="Bahnschrift Condensed" pitchFamily="34" charset="0"/>
               </a:rPr>
-              <a:t>Find </a:t>
-            </a:r>
-            <a:r>
-              <a:rPr lang="en-US" sz="2400" dirty="0" smtClean="0">
-                <a:latin typeface="Bahnschrift Condensed" pitchFamily="34" charset="0"/>
-              </a:rPr>
-              <a:t>Data : </a:t>
+              <a:t>Find Data : </a:t>
             </a:r>
             <a:endParaRPr lang="en-US" dirty="0" smtClean="0">
               <a:latin typeface="Bahnschrift Condensed" pitchFamily="34" charset="0"/>
@@ -3919,13 +3909,7 @@
               <a:rPr lang="en-US" sz="2400" dirty="0" smtClean="0">
                 <a:latin typeface="Bahnschrift Condensed" pitchFamily="34" charset="0"/>
               </a:rPr>
-              <a:t>Find </a:t>
-            </a:r>
-            <a:r>
-              <a:rPr lang="en-US" sz="2400" dirty="0" smtClean="0">
-                <a:latin typeface="Bahnschrift Condensed" pitchFamily="34" charset="0"/>
-              </a:rPr>
-              <a:t>Data : </a:t>
+              <a:t>Find Data : </a:t>
             </a:r>
             <a:endParaRPr lang="en-US" dirty="0" smtClean="0">
               <a:latin typeface="Bahnschrift Condensed" pitchFamily="34" charset="0"/>
@@ -4128,13 +4112,7 @@
               <a:rPr lang="en-US" sz="2400" dirty="0" smtClean="0">
                 <a:latin typeface="Bahnschrift Condensed" pitchFamily="34" charset="0"/>
               </a:rPr>
-              <a:t>Find </a:t>
-            </a:r>
-            <a:r>
-              <a:rPr lang="en-US" sz="2400" dirty="0" smtClean="0">
-                <a:latin typeface="Bahnschrift Condensed" pitchFamily="34" charset="0"/>
-              </a:rPr>
-              <a:t>Data : </a:t>
+              <a:t>Find Data : </a:t>
             </a:r>
             <a:endParaRPr lang="en-US" dirty="0" smtClean="0">
               <a:latin typeface="Bahnschrift Condensed" pitchFamily="34" charset="0"/>
@@ -4342,13 +4320,7 @@
               <a:rPr lang="en-US" sz="2400" dirty="0" smtClean="0">
                 <a:latin typeface="Bahnschrift Condensed" pitchFamily="34" charset="0"/>
               </a:rPr>
-              <a:t>Find </a:t>
-            </a:r>
-            <a:r>
-              <a:rPr lang="en-US" sz="2400" dirty="0" smtClean="0">
-                <a:latin typeface="Bahnschrift Condensed" pitchFamily="34" charset="0"/>
-              </a:rPr>
-              <a:t>Data : </a:t>
+              <a:t>Find Data : </a:t>
             </a:r>
             <a:endParaRPr lang="en-US" dirty="0" smtClean="0">
               <a:latin typeface="Bahnschrift Condensed" pitchFamily="34" charset="0"/>
@@ -4367,7 +4339,6 @@
               <a:rPr lang="en-US" dirty="0" smtClean="0"/>
               <a:t>with query </a:t>
             </a:r>
-            <a:endParaRPr lang="en-US" dirty="0" smtClean="0"/>
           </a:p>
         </p:txBody>
       </p:sp>
@@ -4552,13 +4523,7 @@
               <a:rPr lang="en-US" sz="2400" dirty="0" smtClean="0">
                 <a:latin typeface="Bahnschrift Condensed" pitchFamily="34" charset="0"/>
               </a:rPr>
-              <a:t>Find </a:t>
-            </a:r>
-            <a:r>
-              <a:rPr lang="en-US" sz="2400" dirty="0" smtClean="0">
-                <a:latin typeface="Bahnschrift Condensed" pitchFamily="34" charset="0"/>
-              </a:rPr>
-              <a:t>Data : </a:t>
+              <a:t>Find Data : </a:t>
             </a:r>
             <a:endParaRPr lang="en-US" dirty="0" smtClean="0">
               <a:latin typeface="Bahnschrift Condensed" pitchFamily="34" charset="0"/>
@@ -4577,7 +4542,6 @@
               <a:rPr lang="en-US" dirty="0" smtClean="0"/>
               <a:t>with limit  </a:t>
             </a:r>
-            <a:endParaRPr lang="en-US" dirty="0" smtClean="0"/>
           </a:p>
         </p:txBody>
       </p:sp>
@@ -4762,13 +4726,7 @@
               <a:rPr lang="en-US" sz="2400" dirty="0" smtClean="0">
                 <a:latin typeface="Bahnschrift Condensed" pitchFamily="34" charset="0"/>
               </a:rPr>
-              <a:t>Find </a:t>
-            </a:r>
-            <a:r>
-              <a:rPr lang="en-US" sz="2400" dirty="0" smtClean="0">
-                <a:latin typeface="Bahnschrift Condensed" pitchFamily="34" charset="0"/>
-              </a:rPr>
-              <a:t>Data : </a:t>
+              <a:t>Find Data : </a:t>
             </a:r>
             <a:endParaRPr lang="en-US" dirty="0" smtClean="0">
               <a:latin typeface="Bahnschrift Condensed" pitchFamily="34" charset="0"/>
@@ -4787,14 +4745,429 @@
               <a:rPr lang="en-US" dirty="0" smtClean="0"/>
               <a:t>with sort</a:t>
             </a:r>
-            <a:endParaRPr lang="en-US" dirty="0" smtClean="0"/>
-          </a:p>
-        </p:txBody>
-      </p:sp>
+          </a:p>
+        </p:txBody>
+      </p:sp>
+      <p:pic>
+        <p:nvPicPr>
+          <p:cNvPr id="1026" name="Picture 2"/>
+          <p:cNvPicPr>
+            <a:picLocks noChangeAspect="1" noChangeArrowheads="1"/>
+          </p:cNvPicPr>
+          <p:nvPr/>
+        </p:nvPicPr>
+        <p:blipFill>
+          <a:blip r:embed="rId3">
+            <a:extLst>
+              <a:ext uri="{28A0092B-C50C-407E-A947-70E740481C1C}">
+                <a14:useLocalDpi xmlns:a14="http://schemas.microsoft.com/office/drawing/2010/main" val="0"/>
+              </a:ext>
+            </a:extLst>
+          </a:blip>
+          <a:srcRect/>
+          <a:stretch>
+            <a:fillRect/>
+          </a:stretch>
+        </p:blipFill>
+        <p:spPr bwMode="auto">
+          <a:xfrm>
+            <a:off x="304800" y="1809750"/>
+            <a:ext cx="8343900" cy="2552700"/>
+          </a:xfrm>
+          <a:prstGeom prst="rect">
+            <a:avLst/>
+          </a:prstGeom>
+          <a:noFill/>
+          <a:ln>
+            <a:noFill/>
+          </a:ln>
+          <a:effectLst/>
+          <a:extLst>
+            <a:ext uri="{909E8E84-426E-40DD-AFC4-6F175D3DCCD1}">
+              <a14:hiddenFill xmlns:a14="http://schemas.microsoft.com/office/drawing/2010/main">
+                <a:solidFill>
+                  <a:schemeClr val="accent1"/>
+                </a:solidFill>
+              </a14:hiddenFill>
+            </a:ext>
+            <a:ext uri="{91240B29-F687-4F45-9708-019B960494DF}">
+              <a14:hiddenLine xmlns:a14="http://schemas.microsoft.com/office/drawing/2010/main" w="9525">
+                <a:solidFill>
+                  <a:schemeClr val="tx1"/>
+                </a:solidFill>
+                <a:miter lim="800000"/>
+                <a:headEnd/>
+                <a:tailEnd/>
+              </a14:hiddenLine>
+            </a:ext>
+            <a:ext uri="{AF507438-7753-43E0-B8FC-AC1667EBCBE1}">
+              <a14:hiddenEffects xmlns:a14="http://schemas.microsoft.com/office/drawing/2010/main">
+                <a:effectLst>
+                  <a:outerShdw dist="35921" dir="2700000" algn="ctr" rotWithShape="0">
+                    <a:schemeClr val="bg2"/>
+                  </a:outerShdw>
+                </a:effectLst>
+              </a14:hiddenEffects>
+            </a:ext>
+          </a:extLst>
+        </p:spPr>
+      </p:pic>
     </p:spTree>
     <p:extLst>
       <p:ext uri="{BB962C8B-B14F-4D97-AF65-F5344CB8AC3E}">
         <p14:creationId xmlns:p14="http://schemas.microsoft.com/office/powerpoint/2010/main" val="1026730170"/>
+      </p:ext>
+    </p:extLst>
+  </p:cSld>
+  <p:clrMapOvr>
+    <a:masterClrMapping/>
+  </p:clrMapOvr>
+  <p:timing>
+    <p:tnLst>
+      <p:par>
+        <p:cTn id="1" dur="indefinite" restart="never" nodeType="tmRoot"/>
+      </p:par>
+    </p:tnLst>
+  </p:timing>
+</p:sld>
+</file>
+
+<file path=ppt/slides/slide18.xml><?xml version="1.0" encoding="utf-8"?>
+<p:sld xmlns:a="http://schemas.openxmlformats.org/drawingml/2006/main" xmlns:r="http://schemas.openxmlformats.org/officeDocument/2006/relationships" xmlns:p="http://schemas.openxmlformats.org/presentationml/2006/main">
+  <p:cSld>
+    <p:bg>
+      <p:bgPr>
+        <a:blipFill dpi="0" rotWithShape="1">
+          <a:blip r:embed="rId2">
+            <a:lum/>
+          </a:blip>
+          <a:srcRect/>
+          <a:stretch>
+            <a:fillRect/>
+          </a:stretch>
+        </a:blipFill>
+        <a:effectLst/>
+      </p:bgPr>
+    </p:bg>
+    <p:spTree>
+      <p:nvGrpSpPr>
+        <p:cNvPr id="1" name=""/>
+        <p:cNvGrpSpPr/>
+        <p:nvPr/>
+      </p:nvGrpSpPr>
+      <p:grpSpPr>
+        <a:xfrm>
+          <a:off x="0" y="0"/>
+          <a:ext cx="0" cy="0"/>
+          <a:chOff x="0" y="0"/>
+          <a:chExt cx="0" cy="0"/>
+        </a:xfrm>
+      </p:grpSpPr>
+      <p:sp>
+        <p:nvSpPr>
+          <p:cNvPr id="4" name="TextBox 3"/>
+          <p:cNvSpPr txBox="1"/>
+          <p:nvPr/>
+        </p:nvSpPr>
+        <p:spPr>
+          <a:xfrm>
+            <a:off x="685800" y="128885"/>
+            <a:ext cx="2475358" cy="461665"/>
+          </a:xfrm>
+          <a:prstGeom prst="rect">
+            <a:avLst/>
+          </a:prstGeom>
+          <a:noFill/>
+        </p:spPr>
+        <p:txBody>
+          <a:bodyPr wrap="none" rtlCol="0">
+            <a:spAutoFit/>
+          </a:bodyPr>
+          <a:lstStyle/>
+          <a:p>
+            <a:r>
+              <a:rPr lang="en-US" sz="2400" dirty="0" smtClean="0">
+                <a:solidFill>
+                  <a:schemeClr val="bg1"/>
+                </a:solidFill>
+                <a:latin typeface="Bahnschrift Condensed" pitchFamily="34" charset="0"/>
+              </a:rPr>
+              <a:t>Node JS With MongoDB</a:t>
+            </a:r>
+            <a:endParaRPr lang="en-US" sz="2400" dirty="0">
+              <a:solidFill>
+                <a:schemeClr val="bg1"/>
+              </a:solidFill>
+              <a:latin typeface="Bahnschrift Condensed" pitchFamily="34" charset="0"/>
+            </a:endParaRPr>
+          </a:p>
+        </p:txBody>
+      </p:sp>
+      <p:sp>
+        <p:nvSpPr>
+          <p:cNvPr id="6" name="TextBox 5"/>
+          <p:cNvSpPr txBox="1"/>
+          <p:nvPr/>
+        </p:nvSpPr>
+        <p:spPr>
+          <a:xfrm>
+            <a:off x="304800" y="895350"/>
+            <a:ext cx="1739451" cy="738664"/>
+          </a:xfrm>
+          <a:prstGeom prst="rect">
+            <a:avLst/>
+          </a:prstGeom>
+          <a:noFill/>
+        </p:spPr>
+        <p:txBody>
+          <a:bodyPr wrap="none" rtlCol="0">
+            <a:spAutoFit/>
+          </a:bodyPr>
+          <a:lstStyle/>
+          <a:p>
+            <a:r>
+              <a:rPr lang="en-US" sz="2400" dirty="0" smtClean="0">
+                <a:latin typeface="Bahnschrift Condensed" pitchFamily="34" charset="0"/>
+              </a:rPr>
+              <a:t>Update Data </a:t>
+            </a:r>
+            <a:r>
+              <a:rPr lang="en-US" sz="2400" dirty="0" smtClean="0">
+                <a:latin typeface="Bahnschrift Condensed" pitchFamily="34" charset="0"/>
+              </a:rPr>
+              <a:t>: </a:t>
+            </a:r>
+            <a:endParaRPr lang="en-US" dirty="0" smtClean="0">
+              <a:latin typeface="Bahnschrift Condensed" pitchFamily="34" charset="0"/>
+            </a:endParaRPr>
+          </a:p>
+          <a:p>
+            <a:pPr marL="285750" indent="-285750">
+              <a:buFont typeface="Arial" pitchFamily="34" charset="0"/>
+              <a:buChar char="•"/>
+            </a:pPr>
+            <a:r>
+              <a:rPr lang="en-US" b="1" dirty="0" err="1" smtClean="0"/>
+              <a:t>updateOne</a:t>
+            </a:r>
+            <a:r>
+              <a:rPr lang="en-US" b="1" dirty="0" smtClean="0"/>
+              <a:t>() </a:t>
+            </a:r>
+            <a:endParaRPr lang="en-US" dirty="0" smtClean="0"/>
+          </a:p>
+        </p:txBody>
+      </p:sp>
+      <p:pic>
+        <p:nvPicPr>
+          <p:cNvPr id="1026" name="Picture 2"/>
+          <p:cNvPicPr>
+            <a:picLocks noChangeAspect="1" noChangeArrowheads="1"/>
+          </p:cNvPicPr>
+          <p:nvPr/>
+        </p:nvPicPr>
+        <p:blipFill>
+          <a:blip r:embed="rId3">
+            <a:extLst>
+              <a:ext uri="{28A0092B-C50C-407E-A947-70E740481C1C}">
+                <a14:useLocalDpi xmlns:a14="http://schemas.microsoft.com/office/drawing/2010/main" val="0"/>
+              </a:ext>
+            </a:extLst>
+          </a:blip>
+          <a:srcRect/>
+          <a:stretch>
+            <a:fillRect/>
+          </a:stretch>
+        </p:blipFill>
+        <p:spPr bwMode="auto">
+          <a:xfrm>
+            <a:off x="457200" y="1657350"/>
+            <a:ext cx="6407150" cy="3003550"/>
+          </a:xfrm>
+          <a:prstGeom prst="rect">
+            <a:avLst/>
+          </a:prstGeom>
+          <a:noFill/>
+          <a:ln>
+            <a:noFill/>
+          </a:ln>
+          <a:effectLst/>
+          <a:extLst>
+            <a:ext uri="{909E8E84-426E-40DD-AFC4-6F175D3DCCD1}">
+              <a14:hiddenFill xmlns:a14="http://schemas.microsoft.com/office/drawing/2010/main">
+                <a:solidFill>
+                  <a:schemeClr val="accent1"/>
+                </a:solidFill>
+              </a14:hiddenFill>
+            </a:ext>
+            <a:ext uri="{91240B29-F687-4F45-9708-019B960494DF}">
+              <a14:hiddenLine xmlns:a14="http://schemas.microsoft.com/office/drawing/2010/main" w="9525">
+                <a:solidFill>
+                  <a:schemeClr val="tx1"/>
+                </a:solidFill>
+                <a:miter lim="800000"/>
+                <a:headEnd/>
+                <a:tailEnd/>
+              </a14:hiddenLine>
+            </a:ext>
+            <a:ext uri="{AF507438-7753-43E0-B8FC-AC1667EBCBE1}">
+              <a14:hiddenEffects xmlns:a14="http://schemas.microsoft.com/office/drawing/2010/main">
+                <a:effectLst>
+                  <a:outerShdw dist="35921" dir="2700000" algn="ctr" rotWithShape="0">
+                    <a:schemeClr val="bg2"/>
+                  </a:outerShdw>
+                </a:effectLst>
+              </a14:hiddenEffects>
+            </a:ext>
+          </a:extLst>
+        </p:spPr>
+      </p:pic>
+    </p:spTree>
+    <p:extLst>
+      <p:ext uri="{BB962C8B-B14F-4D97-AF65-F5344CB8AC3E}">
+        <p14:creationId xmlns:p14="http://schemas.microsoft.com/office/powerpoint/2010/main" val="2704505989"/>
+      </p:ext>
+    </p:extLst>
+  </p:cSld>
+  <p:clrMapOvr>
+    <a:masterClrMapping/>
+  </p:clrMapOvr>
+  <p:timing>
+    <p:tnLst>
+      <p:par>
+        <p:cTn id="1" dur="indefinite" restart="never" nodeType="tmRoot"/>
+      </p:par>
+    </p:tnLst>
+  </p:timing>
+</p:sld>
+</file>
+
+<file path=ppt/slides/slide19.xml><?xml version="1.0" encoding="utf-8"?>
+<p:sld xmlns:a="http://schemas.openxmlformats.org/drawingml/2006/main" xmlns:r="http://schemas.openxmlformats.org/officeDocument/2006/relationships" xmlns:p="http://schemas.openxmlformats.org/presentationml/2006/main">
+  <p:cSld>
+    <p:bg>
+      <p:bgPr>
+        <a:blipFill dpi="0" rotWithShape="1">
+          <a:blip r:embed="rId2">
+            <a:lum/>
+          </a:blip>
+          <a:srcRect/>
+          <a:stretch>
+            <a:fillRect/>
+          </a:stretch>
+        </a:blipFill>
+        <a:effectLst/>
+      </p:bgPr>
+    </p:bg>
+    <p:spTree>
+      <p:nvGrpSpPr>
+        <p:cNvPr id="1" name=""/>
+        <p:cNvGrpSpPr/>
+        <p:nvPr/>
+      </p:nvGrpSpPr>
+      <p:grpSpPr>
+        <a:xfrm>
+          <a:off x="0" y="0"/>
+          <a:ext cx="0" cy="0"/>
+          <a:chOff x="0" y="0"/>
+          <a:chExt cx="0" cy="0"/>
+        </a:xfrm>
+      </p:grpSpPr>
+      <p:sp>
+        <p:nvSpPr>
+          <p:cNvPr id="4" name="TextBox 3"/>
+          <p:cNvSpPr txBox="1"/>
+          <p:nvPr/>
+        </p:nvSpPr>
+        <p:spPr>
+          <a:xfrm>
+            <a:off x="685800" y="128885"/>
+            <a:ext cx="2475358" cy="461665"/>
+          </a:xfrm>
+          <a:prstGeom prst="rect">
+            <a:avLst/>
+          </a:prstGeom>
+          <a:noFill/>
+        </p:spPr>
+        <p:txBody>
+          <a:bodyPr wrap="none" rtlCol="0">
+            <a:spAutoFit/>
+          </a:bodyPr>
+          <a:lstStyle/>
+          <a:p>
+            <a:r>
+              <a:rPr lang="en-US" sz="2400" dirty="0" smtClean="0">
+                <a:solidFill>
+                  <a:schemeClr val="bg1"/>
+                </a:solidFill>
+                <a:latin typeface="Bahnschrift Condensed" pitchFamily="34" charset="0"/>
+              </a:rPr>
+              <a:t>Node JS With MongoDB</a:t>
+            </a:r>
+            <a:endParaRPr lang="en-US" sz="2400" dirty="0">
+              <a:solidFill>
+                <a:schemeClr val="bg1"/>
+              </a:solidFill>
+              <a:latin typeface="Bahnschrift Condensed" pitchFamily="34" charset="0"/>
+            </a:endParaRPr>
+          </a:p>
+        </p:txBody>
+      </p:sp>
+      <p:sp>
+        <p:nvSpPr>
+          <p:cNvPr id="6" name="TextBox 5"/>
+          <p:cNvSpPr txBox="1"/>
+          <p:nvPr/>
+        </p:nvSpPr>
+        <p:spPr>
+          <a:xfrm>
+            <a:off x="304800" y="895350"/>
+            <a:ext cx="1585690" cy="738664"/>
+          </a:xfrm>
+          <a:prstGeom prst="rect">
+            <a:avLst/>
+          </a:prstGeom>
+          <a:noFill/>
+        </p:spPr>
+        <p:txBody>
+          <a:bodyPr wrap="none" rtlCol="0">
+            <a:spAutoFit/>
+          </a:bodyPr>
+          <a:lstStyle/>
+          <a:p>
+            <a:r>
+              <a:rPr lang="en-US" sz="2400" dirty="0" smtClean="0">
+                <a:latin typeface="Bahnschrift Condensed" pitchFamily="34" charset="0"/>
+              </a:rPr>
+              <a:t>Update Data </a:t>
+            </a:r>
+            <a:r>
+              <a:rPr lang="en-US" sz="2400" dirty="0" smtClean="0">
+                <a:latin typeface="Bahnschrift Condensed" pitchFamily="34" charset="0"/>
+              </a:rPr>
+              <a:t>: </a:t>
+            </a:r>
+            <a:endParaRPr lang="en-US" dirty="0" smtClean="0">
+              <a:latin typeface="Bahnschrift Condensed" pitchFamily="34" charset="0"/>
+            </a:endParaRPr>
+          </a:p>
+          <a:p>
+            <a:pPr marL="285750" indent="-285750">
+              <a:buFont typeface="Arial" pitchFamily="34" charset="0"/>
+              <a:buChar char="•"/>
+            </a:pPr>
+            <a:r>
+              <a:rPr lang="en-US" b="1" dirty="0" smtClean="0"/>
+              <a:t>Create DB</a:t>
+            </a:r>
+            <a:endParaRPr lang="en-US" dirty="0" smtClean="0"/>
+          </a:p>
+        </p:txBody>
+      </p:sp>
+    </p:spTree>
+    <p:extLst>
+      <p:ext uri="{BB962C8B-B14F-4D97-AF65-F5344CB8AC3E}">
+        <p14:creationId xmlns:p14="http://schemas.microsoft.com/office/powerpoint/2010/main" val="2059828269"/>
       </p:ext>
     </p:extLst>
   </p:cSld>

</xml_diff>